<commit_message>
small updates on presentation
</commit_message>
<xml_diff>
--- a/Presentations/SAIKS Assignment final.pptx
+++ b/Presentations/SAIKS Assignment final.pptx
@@ -72,12 +72,12 @@
           <a:p>
             <a:pPr algn="ctr"/>
             <a:r>
-              <a:rPr b="0" lang="en-GB" sz="4400" spc="-1" strike="noStrike">
+              <a:rPr b="0" lang="en-US" sz="4400" spc="-1" strike="noStrike">
                 <a:latin typeface="Arial"/>
               </a:rPr>
               <a:t>Click to move the slide</a:t>
             </a:r>
-            <a:endParaRPr b="0" lang="en-GB" sz="4400" spc="-1" strike="noStrike">
+            <a:endParaRPr b="0" lang="en-US" sz="4400" spc="-1" strike="noStrike">
               <a:latin typeface="Arial"/>
             </a:endParaRPr>
           </a:p>
@@ -108,12 +108,12 @@
           </a:bodyPr>
           <a:p>
             <a:r>
-              <a:rPr b="0" lang="en-GB" sz="2000" spc="-1" strike="noStrike">
+              <a:rPr b="0" lang="en-US" sz="2000" spc="-1" strike="noStrike">
                 <a:latin typeface="Arial"/>
               </a:rPr>
-              <a:t>Click to edit the notes' format</a:t>
+              <a:t>Click to edit the notes format</a:t>
             </a:r>
-            <a:endParaRPr b="0" lang="en-GB" sz="2000" spc="-1" strike="noStrike">
+            <a:endParaRPr b="0" lang="en-US" sz="2000" spc="-1" strike="noStrike">
               <a:latin typeface="Arial"/>
             </a:endParaRPr>
           </a:p>
@@ -144,12 +144,12 @@
           </a:bodyPr>
           <a:p>
             <a:r>
-              <a:rPr b="0" lang="en-GB" sz="1400" spc="-1" strike="noStrike">
+              <a:rPr b="0" lang="en-US" sz="1400" spc="-1" strike="noStrike">
                 <a:latin typeface="Times New Roman"/>
               </a:rPr>
               <a:t>&lt;header&gt;</a:t>
             </a:r>
-            <a:endParaRPr b="0" lang="en-GB" sz="1400" spc="-1" strike="noStrike">
+            <a:endParaRPr b="0" lang="en-US" sz="1400" spc="-1" strike="noStrike">
               <a:latin typeface="Times New Roman"/>
             </a:endParaRPr>
           </a:p>
@@ -181,12 +181,12 @@
           <a:p>
             <a:pPr algn="r"/>
             <a:r>
-              <a:rPr b="0" lang="en-GB" sz="1400" spc="-1" strike="noStrike">
+              <a:rPr b="0" lang="en-US" sz="1400" spc="-1" strike="noStrike">
                 <a:latin typeface="Times New Roman"/>
               </a:rPr>
               <a:t>&lt;date/time&gt;</a:t>
             </a:r>
-            <a:endParaRPr b="0" lang="en-GB" sz="1400" spc="-1" strike="noStrike">
+            <a:endParaRPr b="0" lang="en-US" sz="1400" spc="-1" strike="noStrike">
               <a:latin typeface="Times New Roman"/>
             </a:endParaRPr>
           </a:p>
@@ -217,12 +217,12 @@
           </a:bodyPr>
           <a:p>
             <a:r>
-              <a:rPr b="0" lang="en-GB" sz="1400" spc="-1" strike="noStrike">
+              <a:rPr b="0" lang="en-US" sz="1400" spc="-1" strike="noStrike">
                 <a:latin typeface="Times New Roman"/>
               </a:rPr>
               <a:t>&lt;footer&gt;</a:t>
             </a:r>
-            <a:endParaRPr b="0" lang="en-GB" sz="1400" spc="-1" strike="noStrike">
+            <a:endParaRPr b="0" lang="en-US" sz="1400" spc="-1" strike="noStrike">
               <a:latin typeface="Times New Roman"/>
             </a:endParaRPr>
           </a:p>
@@ -253,13 +253,13 @@
           </a:bodyPr>
           <a:p>
             <a:pPr algn="r"/>
-            <a:fld id="{A2A3AEF8-2255-4CF2-9CFE-A9EF934FE6EE}" type="slidenum">
-              <a:rPr b="0" lang="en-GB" sz="1400" spc="-1" strike="noStrike">
+            <a:fld id="{D7C30A90-7141-41DF-92DE-7B91EDAC5270}" type="slidenum">
+              <a:rPr b="0" lang="en-US" sz="1400" spc="-1" strike="noStrike">
                 <a:latin typeface="Times New Roman"/>
               </a:rPr>
               <a:t>&lt;number&gt;</a:t>
             </a:fld>
-            <a:endParaRPr b="0" lang="en-GB" sz="1400" spc="-1" strike="noStrike">
+            <a:endParaRPr b="0" lang="en-US" sz="1400" spc="-1" strike="noStrike">
               <a:latin typeface="Times New Roman"/>
             </a:endParaRPr>
           </a:p>
@@ -301,7 +301,7 @@
         <p:spPr>
           <a:xfrm>
             <a:off x="380880" y="685800"/>
-            <a:ext cx="6093000" cy="3426120"/>
+            <a:ext cx="6092640" cy="3425760"/>
           </a:xfrm>
           <a:prstGeom prst="rect">
             <a:avLst/>
@@ -321,7 +321,7 @@
         <p:spPr>
           <a:xfrm>
             <a:off x="685800" y="4343400"/>
-            <a:ext cx="5483520" cy="4111920"/>
+            <a:ext cx="5483160" cy="4111560"/>
           </a:xfrm>
           <a:prstGeom prst="rect">
             <a:avLst/>
@@ -332,7 +332,7 @@
             <a:normAutofit/>
           </a:bodyPr>
           <a:p>
-            <a:endParaRPr b="0" lang="en-GB" sz="2000" spc="-1" strike="noStrike">
+            <a:endParaRPr b="0" lang="en-US" sz="2000" spc="-1" strike="noStrike">
               <a:latin typeface="Arial"/>
             </a:endParaRPr>
           </a:p>
@@ -347,7 +347,7 @@
         <p:spPr>
           <a:xfrm>
             <a:off x="3884760" y="8685360"/>
-            <a:ext cx="2968920" cy="454320"/>
+            <a:ext cx="2968560" cy="453960"/>
           </a:xfrm>
           <a:prstGeom prst="rect">
             <a:avLst/>
@@ -376,7 +376,7 @@
                 <a:tab algn="l" pos="0"/>
               </a:tabLst>
             </a:pPr>
-            <a:fld id="{03DADB24-0B67-4D3A-B3A9-ABDAC459098C}" type="slidenum">
+            <a:fld id="{9BC0F5EC-9F59-42A5-A259-31EA2A276AF5}" type="slidenum">
               <a:rPr b="0" lang="de-DE" sz="1200" spc="-1" strike="noStrike">
                 <a:solidFill>
                   <a:srgbClr val="000000"/>
@@ -386,7 +386,7 @@
               </a:rPr>
               <a:t>1</a:t>
             </a:fld>
-            <a:endParaRPr b="0" lang="en-GB" sz="1200" spc="-1" strike="noStrike">
+            <a:endParaRPr b="0" lang="en-US" sz="1200" spc="-1" strike="noStrike">
               <a:latin typeface="Arial"/>
             </a:endParaRPr>
           </a:p>
@@ -427,7 +427,7 @@
         <p:spPr>
           <a:xfrm>
             <a:off x="380880" y="685800"/>
-            <a:ext cx="6093000" cy="3426120"/>
+            <a:ext cx="6092640" cy="3425760"/>
           </a:xfrm>
           <a:prstGeom prst="rect">
             <a:avLst/>
@@ -447,7 +447,7 @@
         <p:spPr>
           <a:xfrm>
             <a:off x="685800" y="4343400"/>
-            <a:ext cx="5483520" cy="4111920"/>
+            <a:ext cx="5483160" cy="4111560"/>
           </a:xfrm>
           <a:prstGeom prst="rect">
             <a:avLst/>
@@ -458,7 +458,7 @@
             <a:normAutofit/>
           </a:bodyPr>
           <a:p>
-            <a:endParaRPr b="0" lang="en-GB" sz="2000" spc="-1" strike="noStrike">
+            <a:endParaRPr b="0" lang="en-US" sz="2000" spc="-1" strike="noStrike">
               <a:latin typeface="Arial"/>
             </a:endParaRPr>
           </a:p>
@@ -473,7 +473,7 @@
         <p:spPr>
           <a:xfrm>
             <a:off x="3884760" y="8685360"/>
-            <a:ext cx="2968920" cy="454320"/>
+            <a:ext cx="2968560" cy="453960"/>
           </a:xfrm>
           <a:prstGeom prst="rect">
             <a:avLst/>
@@ -502,7 +502,7 @@
                 <a:tab algn="l" pos="0"/>
               </a:tabLst>
             </a:pPr>
-            <a:fld id="{61B842BF-BB56-423F-A5D6-20EFB1037DF1}" type="slidenum">
+            <a:fld id="{9E9878AA-E75E-48D1-A809-4FDFDF3E7F14}" type="slidenum">
               <a:rPr b="0" lang="de-DE" sz="1200" spc="-1" strike="noStrike">
                 <a:solidFill>
                   <a:srgbClr val="000000"/>
@@ -512,7 +512,7 @@
               </a:rPr>
               <a:t>11</a:t>
             </a:fld>
-            <a:endParaRPr b="0" lang="en-GB" sz="1200" spc="-1" strike="noStrike">
+            <a:endParaRPr b="0" lang="en-US" sz="1200" spc="-1" strike="noStrike">
               <a:latin typeface="Arial"/>
             </a:endParaRPr>
           </a:p>
@@ -553,7 +553,7 @@
         <p:spPr>
           <a:xfrm>
             <a:off x="380880" y="685800"/>
-            <a:ext cx="6093000" cy="3426120"/>
+            <a:ext cx="6092640" cy="3425760"/>
           </a:xfrm>
           <a:prstGeom prst="rect">
             <a:avLst/>
@@ -573,7 +573,7 @@
         <p:spPr>
           <a:xfrm>
             <a:off x="685800" y="4343400"/>
-            <a:ext cx="5483520" cy="4111920"/>
+            <a:ext cx="5483160" cy="4111560"/>
           </a:xfrm>
           <a:prstGeom prst="rect">
             <a:avLst/>
@@ -584,7 +584,7 @@
             <a:noAutofit/>
           </a:bodyPr>
           <a:p>
-            <a:endParaRPr b="0" lang="en-GB" sz="2000" spc="-1" strike="noStrike">
+            <a:endParaRPr b="0" lang="en-US" sz="2000" spc="-1" strike="noStrike">
               <a:latin typeface="Arial"/>
             </a:endParaRPr>
           </a:p>
@@ -599,7 +599,7 @@
         <p:spPr>
           <a:xfrm>
             <a:off x="3884760" y="8685360"/>
-            <a:ext cx="2968920" cy="454320"/>
+            <a:ext cx="2968560" cy="453960"/>
           </a:xfrm>
           <a:prstGeom prst="rect">
             <a:avLst/>
@@ -628,7 +628,7 @@
                 <a:tab algn="l" pos="0"/>
               </a:tabLst>
             </a:pPr>
-            <a:fld id="{C89BD8D0-76F5-406A-AF3C-07FA2F06C817}" type="slidenum">
+            <a:fld id="{3E63604B-90E0-4123-A92E-BF4CC854C406}" type="slidenum">
               <a:rPr b="0" lang="de-DE" sz="1400" spc="-1" strike="noStrike">
                 <a:solidFill>
                   <a:srgbClr val="000000"/>
@@ -637,7 +637,7 @@
               </a:rPr>
               <a:t>&lt;number&gt;</a:t>
             </a:fld>
-            <a:endParaRPr b="0" lang="en-GB" sz="1400" spc="-1" strike="noStrike">
+            <a:endParaRPr b="0" lang="en-US" sz="1400" spc="-1" strike="noStrike">
               <a:latin typeface="Arial"/>
             </a:endParaRPr>
           </a:p>
@@ -678,7 +678,7 @@
         <p:spPr>
           <a:xfrm>
             <a:off x="380880" y="685800"/>
-            <a:ext cx="6093000" cy="3426120"/>
+            <a:ext cx="6092640" cy="3425760"/>
           </a:xfrm>
           <a:prstGeom prst="rect">
             <a:avLst/>
@@ -698,7 +698,7 @@
         <p:spPr>
           <a:xfrm>
             <a:off x="685800" y="4343400"/>
-            <a:ext cx="5483520" cy="4111920"/>
+            <a:ext cx="5483160" cy="4111560"/>
           </a:xfrm>
           <a:prstGeom prst="rect">
             <a:avLst/>
@@ -709,7 +709,7 @@
             <a:noAutofit/>
           </a:bodyPr>
           <a:p>
-            <a:endParaRPr b="0" lang="en-GB" sz="2000" spc="-1" strike="noStrike">
+            <a:endParaRPr b="0" lang="en-US" sz="2000" spc="-1" strike="noStrike">
               <a:latin typeface="Arial"/>
             </a:endParaRPr>
           </a:p>
@@ -724,7 +724,7 @@
         <p:spPr>
           <a:xfrm>
             <a:off x="3884760" y="8685360"/>
-            <a:ext cx="2968920" cy="454320"/>
+            <a:ext cx="2968560" cy="453960"/>
           </a:xfrm>
           <a:prstGeom prst="rect">
             <a:avLst/>
@@ -753,7 +753,7 @@
                 <a:tab algn="l" pos="0"/>
               </a:tabLst>
             </a:pPr>
-            <a:fld id="{7769425B-1090-4708-8E0F-A612F85799B7}" type="slidenum">
+            <a:fld id="{E5BAFAF4-435B-4BA5-B45C-8A557D5DE3D3}" type="slidenum">
               <a:rPr b="0" lang="de-DE" sz="1400" spc="-1" strike="noStrike">
                 <a:solidFill>
                   <a:srgbClr val="000000"/>
@@ -762,7 +762,7 @@
               </a:rPr>
               <a:t>&lt;number&gt;</a:t>
             </a:fld>
-            <a:endParaRPr b="0" lang="en-GB" sz="1400" spc="-1" strike="noStrike">
+            <a:endParaRPr b="0" lang="en-US" sz="1400" spc="-1" strike="noStrike">
               <a:latin typeface="Arial"/>
             </a:endParaRPr>
           </a:p>
@@ -837,7 +837,7 @@
           </a:bodyPr>
           <a:p>
             <a:pPr algn="ctr"/>
-            <a:endParaRPr b="0" lang="en-GB" sz="4400" spc="-1" strike="noStrike">
+            <a:endParaRPr b="0" lang="en-US" sz="4400" spc="-1" strike="noStrike">
               <a:latin typeface="Arial"/>
             </a:endParaRPr>
           </a:p>
@@ -867,7 +867,7 @@
             <a:normAutofit/>
           </a:bodyPr>
           <a:p>
-            <a:endParaRPr b="0" lang="en-GB" sz="3200" spc="-1" strike="noStrike">
+            <a:endParaRPr b="0" lang="en-US" sz="3200" spc="-1" strike="noStrike">
               <a:latin typeface="Arial"/>
             </a:endParaRPr>
           </a:p>
@@ -897,7 +897,7 @@
             <a:normAutofit/>
           </a:bodyPr>
           <a:p>
-            <a:endParaRPr b="0" lang="en-GB" sz="3200" spc="-1" strike="noStrike">
+            <a:endParaRPr b="0" lang="en-US" sz="3200" spc="-1" strike="noStrike">
               <a:latin typeface="Arial"/>
             </a:endParaRPr>
           </a:p>
@@ -950,7 +950,7 @@
           </a:bodyPr>
           <a:p>
             <a:pPr algn="ctr"/>
-            <a:endParaRPr b="0" lang="en-GB" sz="4400" spc="-1" strike="noStrike">
+            <a:endParaRPr b="0" lang="en-US" sz="4400" spc="-1" strike="noStrike">
               <a:latin typeface="Arial"/>
             </a:endParaRPr>
           </a:p>
@@ -980,7 +980,7 @@
             <a:normAutofit/>
           </a:bodyPr>
           <a:p>
-            <a:endParaRPr b="0" lang="en-GB" sz="3200" spc="-1" strike="noStrike">
+            <a:endParaRPr b="0" lang="en-US" sz="3200" spc="-1" strike="noStrike">
               <a:latin typeface="Arial"/>
             </a:endParaRPr>
           </a:p>
@@ -1010,7 +1010,7 @@
             <a:normAutofit/>
           </a:bodyPr>
           <a:p>
-            <a:endParaRPr b="0" lang="en-GB" sz="3200" spc="-1" strike="noStrike">
+            <a:endParaRPr b="0" lang="en-US" sz="3200" spc="-1" strike="noStrike">
               <a:latin typeface="Arial"/>
             </a:endParaRPr>
           </a:p>
@@ -1040,7 +1040,7 @@
             <a:normAutofit/>
           </a:bodyPr>
           <a:p>
-            <a:endParaRPr b="0" lang="en-GB" sz="3200" spc="-1" strike="noStrike">
+            <a:endParaRPr b="0" lang="en-US" sz="3200" spc="-1" strike="noStrike">
               <a:latin typeface="Arial"/>
             </a:endParaRPr>
           </a:p>
@@ -1070,7 +1070,7 @@
             <a:normAutofit/>
           </a:bodyPr>
           <a:p>
-            <a:endParaRPr b="0" lang="en-GB" sz="3200" spc="-1" strike="noStrike">
+            <a:endParaRPr b="0" lang="en-US" sz="3200" spc="-1" strike="noStrike">
               <a:latin typeface="Arial"/>
             </a:endParaRPr>
           </a:p>
@@ -1123,7 +1123,7 @@
           </a:bodyPr>
           <a:p>
             <a:pPr algn="ctr"/>
-            <a:endParaRPr b="0" lang="en-GB" sz="4400" spc="-1" strike="noStrike">
+            <a:endParaRPr b="0" lang="en-US" sz="4400" spc="-1" strike="noStrike">
               <a:latin typeface="Arial"/>
             </a:endParaRPr>
           </a:p>
@@ -1153,7 +1153,7 @@
             <a:normAutofit/>
           </a:bodyPr>
           <a:p>
-            <a:endParaRPr b="0" lang="en-GB" sz="3200" spc="-1" strike="noStrike">
+            <a:endParaRPr b="0" lang="en-US" sz="3200" spc="-1" strike="noStrike">
               <a:latin typeface="Arial"/>
             </a:endParaRPr>
           </a:p>
@@ -1183,7 +1183,7 @@
             <a:normAutofit/>
           </a:bodyPr>
           <a:p>
-            <a:endParaRPr b="0" lang="en-GB" sz="3200" spc="-1" strike="noStrike">
+            <a:endParaRPr b="0" lang="en-US" sz="3200" spc="-1" strike="noStrike">
               <a:latin typeface="Arial"/>
             </a:endParaRPr>
           </a:p>
@@ -1213,7 +1213,7 @@
             <a:normAutofit/>
           </a:bodyPr>
           <a:p>
-            <a:endParaRPr b="0" lang="en-GB" sz="3200" spc="-1" strike="noStrike">
+            <a:endParaRPr b="0" lang="en-US" sz="3200" spc="-1" strike="noStrike">
               <a:latin typeface="Arial"/>
             </a:endParaRPr>
           </a:p>
@@ -1243,7 +1243,7 @@
             <a:normAutofit/>
           </a:bodyPr>
           <a:p>
-            <a:endParaRPr b="0" lang="en-GB" sz="3200" spc="-1" strike="noStrike">
+            <a:endParaRPr b="0" lang="en-US" sz="3200" spc="-1" strike="noStrike">
               <a:latin typeface="Arial"/>
             </a:endParaRPr>
           </a:p>
@@ -1273,7 +1273,7 @@
             <a:normAutofit/>
           </a:bodyPr>
           <a:p>
-            <a:endParaRPr b="0" lang="en-GB" sz="3200" spc="-1" strike="noStrike">
+            <a:endParaRPr b="0" lang="en-US" sz="3200" spc="-1" strike="noStrike">
               <a:latin typeface="Arial"/>
             </a:endParaRPr>
           </a:p>
@@ -1303,7 +1303,7 @@
             <a:normAutofit/>
           </a:bodyPr>
           <a:p>
-            <a:endParaRPr b="0" lang="en-GB" sz="3200" spc="-1" strike="noStrike">
+            <a:endParaRPr b="0" lang="en-US" sz="3200" spc="-1" strike="noStrike">
               <a:latin typeface="Arial"/>
             </a:endParaRPr>
           </a:p>
@@ -1378,7 +1378,7 @@
           </a:bodyPr>
           <a:p>
             <a:pPr algn="ctr"/>
-            <a:endParaRPr b="0" lang="en-GB" sz="4400" spc="-1" strike="noStrike">
+            <a:endParaRPr b="0" lang="en-US" sz="4400" spc="-1" strike="noStrike">
               <a:latin typeface="Arial"/>
             </a:endParaRPr>
           </a:p>
@@ -1409,7 +1409,7 @@
           </a:bodyPr>
           <a:p>
             <a:pPr algn="ctr"/>
-            <a:endParaRPr b="0" lang="en-GB" sz="3200" spc="-1" strike="noStrike">
+            <a:endParaRPr b="0" lang="en-US" sz="3200" spc="-1" strike="noStrike">
               <a:latin typeface="Arial"/>
             </a:endParaRPr>
           </a:p>
@@ -1462,7 +1462,7 @@
           </a:bodyPr>
           <a:p>
             <a:pPr algn="ctr"/>
-            <a:endParaRPr b="0" lang="en-GB" sz="4400" spc="-1" strike="noStrike">
+            <a:endParaRPr b="0" lang="en-US" sz="4400" spc="-1" strike="noStrike">
               <a:latin typeface="Arial"/>
             </a:endParaRPr>
           </a:p>
@@ -1492,7 +1492,7 @@
             <a:normAutofit/>
           </a:bodyPr>
           <a:p>
-            <a:endParaRPr b="0" lang="en-GB" sz="3200" spc="-1" strike="noStrike">
+            <a:endParaRPr b="0" lang="en-US" sz="3200" spc="-1" strike="noStrike">
               <a:latin typeface="Arial"/>
             </a:endParaRPr>
           </a:p>
@@ -1545,7 +1545,7 @@
           </a:bodyPr>
           <a:p>
             <a:pPr algn="ctr"/>
-            <a:endParaRPr b="0" lang="en-GB" sz="4400" spc="-1" strike="noStrike">
+            <a:endParaRPr b="0" lang="en-US" sz="4400" spc="-1" strike="noStrike">
               <a:latin typeface="Arial"/>
             </a:endParaRPr>
           </a:p>
@@ -1575,7 +1575,7 @@
             <a:normAutofit/>
           </a:bodyPr>
           <a:p>
-            <a:endParaRPr b="0" lang="en-GB" sz="3200" spc="-1" strike="noStrike">
+            <a:endParaRPr b="0" lang="en-US" sz="3200" spc="-1" strike="noStrike">
               <a:latin typeface="Arial"/>
             </a:endParaRPr>
           </a:p>
@@ -1605,7 +1605,7 @@
             <a:normAutofit/>
           </a:bodyPr>
           <a:p>
-            <a:endParaRPr b="0" lang="en-GB" sz="3200" spc="-1" strike="noStrike">
+            <a:endParaRPr b="0" lang="en-US" sz="3200" spc="-1" strike="noStrike">
               <a:latin typeface="Arial"/>
             </a:endParaRPr>
           </a:p>
@@ -1658,7 +1658,7 @@
           </a:bodyPr>
           <a:p>
             <a:pPr algn="ctr"/>
-            <a:endParaRPr b="0" lang="en-GB" sz="4400" spc="-1" strike="noStrike">
+            <a:endParaRPr b="0" lang="en-US" sz="4400" spc="-1" strike="noStrike">
               <a:latin typeface="Arial"/>
             </a:endParaRPr>
           </a:p>
@@ -1711,7 +1711,7 @@
           </a:bodyPr>
           <a:p>
             <a:pPr algn="ctr"/>
-            <a:endParaRPr b="0" lang="en-GB" sz="3200" spc="-1" strike="noStrike">
+            <a:endParaRPr b="0" lang="en-US" sz="3200" spc="-1" strike="noStrike">
               <a:latin typeface="Arial"/>
             </a:endParaRPr>
           </a:p>
@@ -1764,7 +1764,7 @@
           </a:bodyPr>
           <a:p>
             <a:pPr algn="ctr"/>
-            <a:endParaRPr b="0" lang="en-GB" sz="4400" spc="-1" strike="noStrike">
+            <a:endParaRPr b="0" lang="en-US" sz="4400" spc="-1" strike="noStrike">
               <a:latin typeface="Arial"/>
             </a:endParaRPr>
           </a:p>
@@ -1794,7 +1794,7 @@
             <a:normAutofit/>
           </a:bodyPr>
           <a:p>
-            <a:endParaRPr b="0" lang="en-GB" sz="3200" spc="-1" strike="noStrike">
+            <a:endParaRPr b="0" lang="en-US" sz="3200" spc="-1" strike="noStrike">
               <a:latin typeface="Arial"/>
             </a:endParaRPr>
           </a:p>
@@ -1824,7 +1824,7 @@
             <a:normAutofit/>
           </a:bodyPr>
           <a:p>
-            <a:endParaRPr b="0" lang="en-GB" sz="3200" spc="-1" strike="noStrike">
+            <a:endParaRPr b="0" lang="en-US" sz="3200" spc="-1" strike="noStrike">
               <a:latin typeface="Arial"/>
             </a:endParaRPr>
           </a:p>
@@ -1854,7 +1854,7 @@
             <a:normAutofit/>
           </a:bodyPr>
           <a:p>
-            <a:endParaRPr b="0" lang="en-GB" sz="3200" spc="-1" strike="noStrike">
+            <a:endParaRPr b="0" lang="en-US" sz="3200" spc="-1" strike="noStrike">
               <a:latin typeface="Arial"/>
             </a:endParaRPr>
           </a:p>
@@ -1907,7 +1907,7 @@
           </a:bodyPr>
           <a:p>
             <a:pPr algn="ctr"/>
-            <a:endParaRPr b="0" lang="en-GB" sz="4400" spc="-1" strike="noStrike">
+            <a:endParaRPr b="0" lang="en-US" sz="4400" spc="-1" strike="noStrike">
               <a:latin typeface="Arial"/>
             </a:endParaRPr>
           </a:p>
@@ -1938,7 +1938,7 @@
           </a:bodyPr>
           <a:p>
             <a:pPr algn="ctr"/>
-            <a:endParaRPr b="0" lang="en-GB" sz="3200" spc="-1" strike="noStrike">
+            <a:endParaRPr b="0" lang="en-US" sz="3200" spc="-1" strike="noStrike">
               <a:latin typeface="Arial"/>
             </a:endParaRPr>
           </a:p>
@@ -1991,7 +1991,7 @@
           </a:bodyPr>
           <a:p>
             <a:pPr algn="ctr"/>
-            <a:endParaRPr b="0" lang="en-GB" sz="4400" spc="-1" strike="noStrike">
+            <a:endParaRPr b="0" lang="en-US" sz="4400" spc="-1" strike="noStrike">
               <a:latin typeface="Arial"/>
             </a:endParaRPr>
           </a:p>
@@ -2021,7 +2021,7 @@
             <a:normAutofit/>
           </a:bodyPr>
           <a:p>
-            <a:endParaRPr b="0" lang="en-GB" sz="3200" spc="-1" strike="noStrike">
+            <a:endParaRPr b="0" lang="en-US" sz="3200" spc="-1" strike="noStrike">
               <a:latin typeface="Arial"/>
             </a:endParaRPr>
           </a:p>
@@ -2051,7 +2051,7 @@
             <a:normAutofit/>
           </a:bodyPr>
           <a:p>
-            <a:endParaRPr b="0" lang="en-GB" sz="3200" spc="-1" strike="noStrike">
+            <a:endParaRPr b="0" lang="en-US" sz="3200" spc="-1" strike="noStrike">
               <a:latin typeface="Arial"/>
             </a:endParaRPr>
           </a:p>
@@ -2081,7 +2081,7 @@
             <a:normAutofit/>
           </a:bodyPr>
           <a:p>
-            <a:endParaRPr b="0" lang="en-GB" sz="3200" spc="-1" strike="noStrike">
+            <a:endParaRPr b="0" lang="en-US" sz="3200" spc="-1" strike="noStrike">
               <a:latin typeface="Arial"/>
             </a:endParaRPr>
           </a:p>
@@ -2134,7 +2134,7 @@
           </a:bodyPr>
           <a:p>
             <a:pPr algn="ctr"/>
-            <a:endParaRPr b="0" lang="en-GB" sz="4400" spc="-1" strike="noStrike">
+            <a:endParaRPr b="0" lang="en-US" sz="4400" spc="-1" strike="noStrike">
               <a:latin typeface="Arial"/>
             </a:endParaRPr>
           </a:p>
@@ -2164,7 +2164,7 @@
             <a:normAutofit/>
           </a:bodyPr>
           <a:p>
-            <a:endParaRPr b="0" lang="en-GB" sz="3200" spc="-1" strike="noStrike">
+            <a:endParaRPr b="0" lang="en-US" sz="3200" spc="-1" strike="noStrike">
               <a:latin typeface="Arial"/>
             </a:endParaRPr>
           </a:p>
@@ -2194,7 +2194,7 @@
             <a:normAutofit/>
           </a:bodyPr>
           <a:p>
-            <a:endParaRPr b="0" lang="en-GB" sz="3200" spc="-1" strike="noStrike">
+            <a:endParaRPr b="0" lang="en-US" sz="3200" spc="-1" strike="noStrike">
               <a:latin typeface="Arial"/>
             </a:endParaRPr>
           </a:p>
@@ -2224,7 +2224,7 @@
             <a:normAutofit/>
           </a:bodyPr>
           <a:p>
-            <a:endParaRPr b="0" lang="en-GB" sz="3200" spc="-1" strike="noStrike">
+            <a:endParaRPr b="0" lang="en-US" sz="3200" spc="-1" strike="noStrike">
               <a:latin typeface="Arial"/>
             </a:endParaRPr>
           </a:p>
@@ -2277,7 +2277,7 @@
           </a:bodyPr>
           <a:p>
             <a:pPr algn="ctr"/>
-            <a:endParaRPr b="0" lang="en-GB" sz="4400" spc="-1" strike="noStrike">
+            <a:endParaRPr b="0" lang="en-US" sz="4400" spc="-1" strike="noStrike">
               <a:latin typeface="Arial"/>
             </a:endParaRPr>
           </a:p>
@@ -2307,7 +2307,7 @@
             <a:normAutofit/>
           </a:bodyPr>
           <a:p>
-            <a:endParaRPr b="0" lang="en-GB" sz="3200" spc="-1" strike="noStrike">
+            <a:endParaRPr b="0" lang="en-US" sz="3200" spc="-1" strike="noStrike">
               <a:latin typeface="Arial"/>
             </a:endParaRPr>
           </a:p>
@@ -2337,7 +2337,7 @@
             <a:normAutofit/>
           </a:bodyPr>
           <a:p>
-            <a:endParaRPr b="0" lang="en-GB" sz="3200" spc="-1" strike="noStrike">
+            <a:endParaRPr b="0" lang="en-US" sz="3200" spc="-1" strike="noStrike">
               <a:latin typeface="Arial"/>
             </a:endParaRPr>
           </a:p>
@@ -2390,7 +2390,7 @@
           </a:bodyPr>
           <a:p>
             <a:pPr algn="ctr"/>
-            <a:endParaRPr b="0" lang="en-GB" sz="4400" spc="-1" strike="noStrike">
+            <a:endParaRPr b="0" lang="en-US" sz="4400" spc="-1" strike="noStrike">
               <a:latin typeface="Arial"/>
             </a:endParaRPr>
           </a:p>
@@ -2420,7 +2420,7 @@
             <a:normAutofit/>
           </a:bodyPr>
           <a:p>
-            <a:endParaRPr b="0" lang="en-GB" sz="3200" spc="-1" strike="noStrike">
+            <a:endParaRPr b="0" lang="en-US" sz="3200" spc="-1" strike="noStrike">
               <a:latin typeface="Arial"/>
             </a:endParaRPr>
           </a:p>
@@ -2450,7 +2450,7 @@
             <a:normAutofit/>
           </a:bodyPr>
           <a:p>
-            <a:endParaRPr b="0" lang="en-GB" sz="3200" spc="-1" strike="noStrike">
+            <a:endParaRPr b="0" lang="en-US" sz="3200" spc="-1" strike="noStrike">
               <a:latin typeface="Arial"/>
             </a:endParaRPr>
           </a:p>
@@ -2480,7 +2480,7 @@
             <a:normAutofit/>
           </a:bodyPr>
           <a:p>
-            <a:endParaRPr b="0" lang="en-GB" sz="3200" spc="-1" strike="noStrike">
+            <a:endParaRPr b="0" lang="en-US" sz="3200" spc="-1" strike="noStrike">
               <a:latin typeface="Arial"/>
             </a:endParaRPr>
           </a:p>
@@ -2510,7 +2510,7 @@
             <a:normAutofit/>
           </a:bodyPr>
           <a:p>
-            <a:endParaRPr b="0" lang="en-GB" sz="3200" spc="-1" strike="noStrike">
+            <a:endParaRPr b="0" lang="en-US" sz="3200" spc="-1" strike="noStrike">
               <a:latin typeface="Arial"/>
             </a:endParaRPr>
           </a:p>
@@ -2563,7 +2563,7 @@
           </a:bodyPr>
           <a:p>
             <a:pPr algn="ctr"/>
-            <a:endParaRPr b="0" lang="en-GB" sz="4400" spc="-1" strike="noStrike">
+            <a:endParaRPr b="0" lang="en-US" sz="4400" spc="-1" strike="noStrike">
               <a:latin typeface="Arial"/>
             </a:endParaRPr>
           </a:p>
@@ -2593,7 +2593,7 @@
             <a:normAutofit/>
           </a:bodyPr>
           <a:p>
-            <a:endParaRPr b="0" lang="en-GB" sz="3200" spc="-1" strike="noStrike">
+            <a:endParaRPr b="0" lang="en-US" sz="3200" spc="-1" strike="noStrike">
               <a:latin typeface="Arial"/>
             </a:endParaRPr>
           </a:p>
@@ -2623,7 +2623,7 @@
             <a:normAutofit/>
           </a:bodyPr>
           <a:p>
-            <a:endParaRPr b="0" lang="en-GB" sz="3200" spc="-1" strike="noStrike">
+            <a:endParaRPr b="0" lang="en-US" sz="3200" spc="-1" strike="noStrike">
               <a:latin typeface="Arial"/>
             </a:endParaRPr>
           </a:p>
@@ -2653,7 +2653,7 @@
             <a:normAutofit/>
           </a:bodyPr>
           <a:p>
-            <a:endParaRPr b="0" lang="en-GB" sz="3200" spc="-1" strike="noStrike">
+            <a:endParaRPr b="0" lang="en-US" sz="3200" spc="-1" strike="noStrike">
               <a:latin typeface="Arial"/>
             </a:endParaRPr>
           </a:p>
@@ -2683,7 +2683,7 @@
             <a:normAutofit/>
           </a:bodyPr>
           <a:p>
-            <a:endParaRPr b="0" lang="en-GB" sz="3200" spc="-1" strike="noStrike">
+            <a:endParaRPr b="0" lang="en-US" sz="3200" spc="-1" strike="noStrike">
               <a:latin typeface="Arial"/>
             </a:endParaRPr>
           </a:p>
@@ -2713,7 +2713,7 @@
             <a:normAutofit/>
           </a:bodyPr>
           <a:p>
-            <a:endParaRPr b="0" lang="en-GB" sz="3200" spc="-1" strike="noStrike">
+            <a:endParaRPr b="0" lang="en-US" sz="3200" spc="-1" strike="noStrike">
               <a:latin typeface="Arial"/>
             </a:endParaRPr>
           </a:p>
@@ -2743,7 +2743,7 @@
             <a:normAutofit/>
           </a:bodyPr>
           <a:p>
-            <a:endParaRPr b="0" lang="en-GB" sz="3200" spc="-1" strike="noStrike">
+            <a:endParaRPr b="0" lang="en-US" sz="3200" spc="-1" strike="noStrike">
               <a:latin typeface="Arial"/>
             </a:endParaRPr>
           </a:p>
@@ -2818,7 +2818,7 @@
           </a:bodyPr>
           <a:p>
             <a:pPr algn="ctr"/>
-            <a:endParaRPr b="0" lang="en-GB" sz="4400" spc="-1" strike="noStrike">
+            <a:endParaRPr b="0" lang="en-US" sz="4400" spc="-1" strike="noStrike">
               <a:latin typeface="Arial"/>
             </a:endParaRPr>
           </a:p>
@@ -2849,7 +2849,7 @@
           </a:bodyPr>
           <a:p>
             <a:pPr algn="ctr"/>
-            <a:endParaRPr b="0" lang="en-GB" sz="3200" spc="-1" strike="noStrike">
+            <a:endParaRPr b="0" lang="en-US" sz="3200" spc="-1" strike="noStrike">
               <a:latin typeface="Arial"/>
             </a:endParaRPr>
           </a:p>
@@ -2902,7 +2902,7 @@
           </a:bodyPr>
           <a:p>
             <a:pPr algn="ctr"/>
-            <a:endParaRPr b="0" lang="en-GB" sz="4400" spc="-1" strike="noStrike">
+            <a:endParaRPr b="0" lang="en-US" sz="4400" spc="-1" strike="noStrike">
               <a:latin typeface="Arial"/>
             </a:endParaRPr>
           </a:p>
@@ -2932,7 +2932,7 @@
             <a:normAutofit/>
           </a:bodyPr>
           <a:p>
-            <a:endParaRPr b="0" lang="en-GB" sz="3200" spc="-1" strike="noStrike">
+            <a:endParaRPr b="0" lang="en-US" sz="3200" spc="-1" strike="noStrike">
               <a:latin typeface="Arial"/>
             </a:endParaRPr>
           </a:p>
@@ -2985,7 +2985,7 @@
           </a:bodyPr>
           <a:p>
             <a:pPr algn="ctr"/>
-            <a:endParaRPr b="0" lang="en-GB" sz="4400" spc="-1" strike="noStrike">
+            <a:endParaRPr b="0" lang="en-US" sz="4400" spc="-1" strike="noStrike">
               <a:latin typeface="Arial"/>
             </a:endParaRPr>
           </a:p>
@@ -3015,7 +3015,7 @@
             <a:normAutofit/>
           </a:bodyPr>
           <a:p>
-            <a:endParaRPr b="0" lang="en-GB" sz="3200" spc="-1" strike="noStrike">
+            <a:endParaRPr b="0" lang="en-US" sz="3200" spc="-1" strike="noStrike">
               <a:latin typeface="Arial"/>
             </a:endParaRPr>
           </a:p>
@@ -3045,7 +3045,7 @@
             <a:normAutofit/>
           </a:bodyPr>
           <a:p>
-            <a:endParaRPr b="0" lang="en-GB" sz="3200" spc="-1" strike="noStrike">
+            <a:endParaRPr b="0" lang="en-US" sz="3200" spc="-1" strike="noStrike">
               <a:latin typeface="Arial"/>
             </a:endParaRPr>
           </a:p>
@@ -3098,7 +3098,7 @@
           </a:bodyPr>
           <a:p>
             <a:pPr algn="ctr"/>
-            <a:endParaRPr b="0" lang="en-GB" sz="4400" spc="-1" strike="noStrike">
+            <a:endParaRPr b="0" lang="en-US" sz="4400" spc="-1" strike="noStrike">
               <a:latin typeface="Arial"/>
             </a:endParaRPr>
           </a:p>
@@ -3151,7 +3151,7 @@
           </a:bodyPr>
           <a:p>
             <a:pPr algn="ctr"/>
-            <a:endParaRPr b="0" lang="en-GB" sz="4400" spc="-1" strike="noStrike">
+            <a:endParaRPr b="0" lang="en-US" sz="4400" spc="-1" strike="noStrike">
               <a:latin typeface="Arial"/>
             </a:endParaRPr>
           </a:p>
@@ -3181,7 +3181,7 @@
             <a:normAutofit/>
           </a:bodyPr>
           <a:p>
-            <a:endParaRPr b="0" lang="en-GB" sz="3200" spc="-1" strike="noStrike">
+            <a:endParaRPr b="0" lang="en-US" sz="3200" spc="-1" strike="noStrike">
               <a:latin typeface="Arial"/>
             </a:endParaRPr>
           </a:p>
@@ -3234,7 +3234,7 @@
           </a:bodyPr>
           <a:p>
             <a:pPr algn="ctr"/>
-            <a:endParaRPr b="0" lang="en-GB" sz="3200" spc="-1" strike="noStrike">
+            <a:endParaRPr b="0" lang="en-US" sz="3200" spc="-1" strike="noStrike">
               <a:latin typeface="Arial"/>
             </a:endParaRPr>
           </a:p>
@@ -3287,7 +3287,7 @@
           </a:bodyPr>
           <a:p>
             <a:pPr algn="ctr"/>
-            <a:endParaRPr b="0" lang="en-GB" sz="4400" spc="-1" strike="noStrike">
+            <a:endParaRPr b="0" lang="en-US" sz="4400" spc="-1" strike="noStrike">
               <a:latin typeface="Arial"/>
             </a:endParaRPr>
           </a:p>
@@ -3317,7 +3317,7 @@
             <a:normAutofit/>
           </a:bodyPr>
           <a:p>
-            <a:endParaRPr b="0" lang="en-GB" sz="3200" spc="-1" strike="noStrike">
+            <a:endParaRPr b="0" lang="en-US" sz="3200" spc="-1" strike="noStrike">
               <a:latin typeface="Arial"/>
             </a:endParaRPr>
           </a:p>
@@ -3347,7 +3347,7 @@
             <a:normAutofit/>
           </a:bodyPr>
           <a:p>
-            <a:endParaRPr b="0" lang="en-GB" sz="3200" spc="-1" strike="noStrike">
+            <a:endParaRPr b="0" lang="en-US" sz="3200" spc="-1" strike="noStrike">
               <a:latin typeface="Arial"/>
             </a:endParaRPr>
           </a:p>
@@ -3377,7 +3377,7 @@
             <a:normAutofit/>
           </a:bodyPr>
           <a:p>
-            <a:endParaRPr b="0" lang="en-GB" sz="3200" spc="-1" strike="noStrike">
+            <a:endParaRPr b="0" lang="en-US" sz="3200" spc="-1" strike="noStrike">
               <a:latin typeface="Arial"/>
             </a:endParaRPr>
           </a:p>
@@ -3430,7 +3430,7 @@
           </a:bodyPr>
           <a:p>
             <a:pPr algn="ctr"/>
-            <a:endParaRPr b="0" lang="en-GB" sz="4400" spc="-1" strike="noStrike">
+            <a:endParaRPr b="0" lang="en-US" sz="4400" spc="-1" strike="noStrike">
               <a:latin typeface="Arial"/>
             </a:endParaRPr>
           </a:p>
@@ -3460,7 +3460,7 @@
             <a:normAutofit/>
           </a:bodyPr>
           <a:p>
-            <a:endParaRPr b="0" lang="en-GB" sz="3200" spc="-1" strike="noStrike">
+            <a:endParaRPr b="0" lang="en-US" sz="3200" spc="-1" strike="noStrike">
               <a:latin typeface="Arial"/>
             </a:endParaRPr>
           </a:p>
@@ -3490,7 +3490,7 @@
             <a:normAutofit/>
           </a:bodyPr>
           <a:p>
-            <a:endParaRPr b="0" lang="en-GB" sz="3200" spc="-1" strike="noStrike">
+            <a:endParaRPr b="0" lang="en-US" sz="3200" spc="-1" strike="noStrike">
               <a:latin typeface="Arial"/>
             </a:endParaRPr>
           </a:p>
@@ -3520,7 +3520,7 @@
             <a:normAutofit/>
           </a:bodyPr>
           <a:p>
-            <a:endParaRPr b="0" lang="en-GB" sz="3200" spc="-1" strike="noStrike">
+            <a:endParaRPr b="0" lang="en-US" sz="3200" spc="-1" strike="noStrike">
               <a:latin typeface="Arial"/>
             </a:endParaRPr>
           </a:p>
@@ -3573,7 +3573,7 @@
           </a:bodyPr>
           <a:p>
             <a:pPr algn="ctr"/>
-            <a:endParaRPr b="0" lang="en-GB" sz="4400" spc="-1" strike="noStrike">
+            <a:endParaRPr b="0" lang="en-US" sz="4400" spc="-1" strike="noStrike">
               <a:latin typeface="Arial"/>
             </a:endParaRPr>
           </a:p>
@@ -3603,7 +3603,7 @@
             <a:normAutofit/>
           </a:bodyPr>
           <a:p>
-            <a:endParaRPr b="0" lang="en-GB" sz="3200" spc="-1" strike="noStrike">
+            <a:endParaRPr b="0" lang="en-US" sz="3200" spc="-1" strike="noStrike">
               <a:latin typeface="Arial"/>
             </a:endParaRPr>
           </a:p>
@@ -3633,7 +3633,7 @@
             <a:normAutofit/>
           </a:bodyPr>
           <a:p>
-            <a:endParaRPr b="0" lang="en-GB" sz="3200" spc="-1" strike="noStrike">
+            <a:endParaRPr b="0" lang="en-US" sz="3200" spc="-1" strike="noStrike">
               <a:latin typeface="Arial"/>
             </a:endParaRPr>
           </a:p>
@@ -3663,7 +3663,7 @@
             <a:normAutofit/>
           </a:bodyPr>
           <a:p>
-            <a:endParaRPr b="0" lang="en-GB" sz="3200" spc="-1" strike="noStrike">
+            <a:endParaRPr b="0" lang="en-US" sz="3200" spc="-1" strike="noStrike">
               <a:latin typeface="Arial"/>
             </a:endParaRPr>
           </a:p>
@@ -3716,7 +3716,7 @@
           </a:bodyPr>
           <a:p>
             <a:pPr algn="ctr"/>
-            <a:endParaRPr b="0" lang="en-GB" sz="4400" spc="-1" strike="noStrike">
+            <a:endParaRPr b="0" lang="en-US" sz="4400" spc="-1" strike="noStrike">
               <a:latin typeface="Arial"/>
             </a:endParaRPr>
           </a:p>
@@ -3746,7 +3746,7 @@
             <a:normAutofit/>
           </a:bodyPr>
           <a:p>
-            <a:endParaRPr b="0" lang="en-GB" sz="3200" spc="-1" strike="noStrike">
+            <a:endParaRPr b="0" lang="en-US" sz="3200" spc="-1" strike="noStrike">
               <a:latin typeface="Arial"/>
             </a:endParaRPr>
           </a:p>
@@ -3776,7 +3776,7 @@
             <a:normAutofit/>
           </a:bodyPr>
           <a:p>
-            <a:endParaRPr b="0" lang="en-GB" sz="3200" spc="-1" strike="noStrike">
+            <a:endParaRPr b="0" lang="en-US" sz="3200" spc="-1" strike="noStrike">
               <a:latin typeface="Arial"/>
             </a:endParaRPr>
           </a:p>
@@ -3829,7 +3829,7 @@
           </a:bodyPr>
           <a:p>
             <a:pPr algn="ctr"/>
-            <a:endParaRPr b="0" lang="en-GB" sz="4400" spc="-1" strike="noStrike">
+            <a:endParaRPr b="0" lang="en-US" sz="4400" spc="-1" strike="noStrike">
               <a:latin typeface="Arial"/>
             </a:endParaRPr>
           </a:p>
@@ -3859,7 +3859,7 @@
             <a:normAutofit/>
           </a:bodyPr>
           <a:p>
-            <a:endParaRPr b="0" lang="en-GB" sz="3200" spc="-1" strike="noStrike">
+            <a:endParaRPr b="0" lang="en-US" sz="3200" spc="-1" strike="noStrike">
               <a:latin typeface="Arial"/>
             </a:endParaRPr>
           </a:p>
@@ -3889,7 +3889,7 @@
             <a:normAutofit/>
           </a:bodyPr>
           <a:p>
-            <a:endParaRPr b="0" lang="en-GB" sz="3200" spc="-1" strike="noStrike">
+            <a:endParaRPr b="0" lang="en-US" sz="3200" spc="-1" strike="noStrike">
               <a:latin typeface="Arial"/>
             </a:endParaRPr>
           </a:p>
@@ -3919,7 +3919,7 @@
             <a:normAutofit/>
           </a:bodyPr>
           <a:p>
-            <a:endParaRPr b="0" lang="en-GB" sz="3200" spc="-1" strike="noStrike">
+            <a:endParaRPr b="0" lang="en-US" sz="3200" spc="-1" strike="noStrike">
               <a:latin typeface="Arial"/>
             </a:endParaRPr>
           </a:p>
@@ -3949,7 +3949,7 @@
             <a:normAutofit/>
           </a:bodyPr>
           <a:p>
-            <a:endParaRPr b="0" lang="en-GB" sz="3200" spc="-1" strike="noStrike">
+            <a:endParaRPr b="0" lang="en-US" sz="3200" spc="-1" strike="noStrike">
               <a:latin typeface="Arial"/>
             </a:endParaRPr>
           </a:p>
@@ -4002,7 +4002,7 @@
           </a:bodyPr>
           <a:p>
             <a:pPr algn="ctr"/>
-            <a:endParaRPr b="0" lang="en-GB" sz="4400" spc="-1" strike="noStrike">
+            <a:endParaRPr b="0" lang="en-US" sz="4400" spc="-1" strike="noStrike">
               <a:latin typeface="Arial"/>
             </a:endParaRPr>
           </a:p>
@@ -4032,7 +4032,7 @@
             <a:normAutofit/>
           </a:bodyPr>
           <a:p>
-            <a:endParaRPr b="0" lang="en-GB" sz="3200" spc="-1" strike="noStrike">
+            <a:endParaRPr b="0" lang="en-US" sz="3200" spc="-1" strike="noStrike">
               <a:latin typeface="Arial"/>
             </a:endParaRPr>
           </a:p>
@@ -4062,7 +4062,7 @@
             <a:normAutofit/>
           </a:bodyPr>
           <a:p>
-            <a:endParaRPr b="0" lang="en-GB" sz="3200" spc="-1" strike="noStrike">
+            <a:endParaRPr b="0" lang="en-US" sz="3200" spc="-1" strike="noStrike">
               <a:latin typeface="Arial"/>
             </a:endParaRPr>
           </a:p>
@@ -4092,7 +4092,7 @@
             <a:normAutofit/>
           </a:bodyPr>
           <a:p>
-            <a:endParaRPr b="0" lang="en-GB" sz="3200" spc="-1" strike="noStrike">
+            <a:endParaRPr b="0" lang="en-US" sz="3200" spc="-1" strike="noStrike">
               <a:latin typeface="Arial"/>
             </a:endParaRPr>
           </a:p>
@@ -4122,7 +4122,7 @@
             <a:normAutofit/>
           </a:bodyPr>
           <a:p>
-            <a:endParaRPr b="0" lang="en-GB" sz="3200" spc="-1" strike="noStrike">
+            <a:endParaRPr b="0" lang="en-US" sz="3200" spc="-1" strike="noStrike">
               <a:latin typeface="Arial"/>
             </a:endParaRPr>
           </a:p>
@@ -4152,7 +4152,7 @@
             <a:normAutofit/>
           </a:bodyPr>
           <a:p>
-            <a:endParaRPr b="0" lang="en-GB" sz="3200" spc="-1" strike="noStrike">
+            <a:endParaRPr b="0" lang="en-US" sz="3200" spc="-1" strike="noStrike">
               <a:latin typeface="Arial"/>
             </a:endParaRPr>
           </a:p>
@@ -4182,7 +4182,7 @@
             <a:normAutofit/>
           </a:bodyPr>
           <a:p>
-            <a:endParaRPr b="0" lang="en-GB" sz="3200" spc="-1" strike="noStrike">
+            <a:endParaRPr b="0" lang="en-US" sz="3200" spc="-1" strike="noStrike">
               <a:latin typeface="Arial"/>
             </a:endParaRPr>
           </a:p>
@@ -4257,7 +4257,7 @@
           </a:bodyPr>
           <a:p>
             <a:pPr algn="ctr"/>
-            <a:endParaRPr b="0" lang="en-GB" sz="4400" spc="-1" strike="noStrike">
+            <a:endParaRPr b="0" lang="en-US" sz="4400" spc="-1" strike="noStrike">
               <a:latin typeface="Arial"/>
             </a:endParaRPr>
           </a:p>
@@ -4288,7 +4288,7 @@
           </a:bodyPr>
           <a:p>
             <a:pPr algn="ctr"/>
-            <a:endParaRPr b="0" lang="en-GB" sz="3200" spc="-1" strike="noStrike">
+            <a:endParaRPr b="0" lang="en-US" sz="3200" spc="-1" strike="noStrike">
               <a:latin typeface="Arial"/>
             </a:endParaRPr>
           </a:p>
@@ -4341,7 +4341,7 @@
           </a:bodyPr>
           <a:p>
             <a:pPr algn="ctr"/>
-            <a:endParaRPr b="0" lang="en-GB" sz="4400" spc="-1" strike="noStrike">
+            <a:endParaRPr b="0" lang="en-US" sz="4400" spc="-1" strike="noStrike">
               <a:latin typeface="Arial"/>
             </a:endParaRPr>
           </a:p>
@@ -4371,7 +4371,7 @@
             <a:normAutofit/>
           </a:bodyPr>
           <a:p>
-            <a:endParaRPr b="0" lang="en-GB" sz="3200" spc="-1" strike="noStrike">
+            <a:endParaRPr b="0" lang="en-US" sz="3200" spc="-1" strike="noStrike">
               <a:latin typeface="Arial"/>
             </a:endParaRPr>
           </a:p>
@@ -4424,7 +4424,7 @@
           </a:bodyPr>
           <a:p>
             <a:pPr algn="ctr"/>
-            <a:endParaRPr b="0" lang="en-GB" sz="4400" spc="-1" strike="noStrike">
+            <a:endParaRPr b="0" lang="en-US" sz="4400" spc="-1" strike="noStrike">
               <a:latin typeface="Arial"/>
             </a:endParaRPr>
           </a:p>
@@ -4454,7 +4454,7 @@
             <a:normAutofit/>
           </a:bodyPr>
           <a:p>
-            <a:endParaRPr b="0" lang="en-GB" sz="3200" spc="-1" strike="noStrike">
+            <a:endParaRPr b="0" lang="en-US" sz="3200" spc="-1" strike="noStrike">
               <a:latin typeface="Arial"/>
             </a:endParaRPr>
           </a:p>
@@ -4484,7 +4484,7 @@
             <a:normAutofit/>
           </a:bodyPr>
           <a:p>
-            <a:endParaRPr b="0" lang="en-GB" sz="3200" spc="-1" strike="noStrike">
+            <a:endParaRPr b="0" lang="en-US" sz="3200" spc="-1" strike="noStrike">
               <a:latin typeface="Arial"/>
             </a:endParaRPr>
           </a:p>
@@ -4537,7 +4537,7 @@
           </a:bodyPr>
           <a:p>
             <a:pPr algn="ctr"/>
-            <a:endParaRPr b="0" lang="en-GB" sz="4400" spc="-1" strike="noStrike">
+            <a:endParaRPr b="0" lang="en-US" sz="4400" spc="-1" strike="noStrike">
               <a:latin typeface="Arial"/>
             </a:endParaRPr>
           </a:p>
@@ -4567,7 +4567,7 @@
             <a:normAutofit/>
           </a:bodyPr>
           <a:p>
-            <a:endParaRPr b="0" lang="en-GB" sz="3200" spc="-1" strike="noStrike">
+            <a:endParaRPr b="0" lang="en-US" sz="3200" spc="-1" strike="noStrike">
               <a:latin typeface="Arial"/>
             </a:endParaRPr>
           </a:p>
@@ -4597,7 +4597,7 @@
             <a:normAutofit/>
           </a:bodyPr>
           <a:p>
-            <a:endParaRPr b="0" lang="en-GB" sz="3200" spc="-1" strike="noStrike">
+            <a:endParaRPr b="0" lang="en-US" sz="3200" spc="-1" strike="noStrike">
               <a:latin typeface="Arial"/>
             </a:endParaRPr>
           </a:p>
@@ -4650,7 +4650,7 @@
           </a:bodyPr>
           <a:p>
             <a:pPr algn="ctr"/>
-            <a:endParaRPr b="0" lang="en-GB" sz="4400" spc="-1" strike="noStrike">
+            <a:endParaRPr b="0" lang="en-US" sz="4400" spc="-1" strike="noStrike">
               <a:latin typeface="Arial"/>
             </a:endParaRPr>
           </a:p>
@@ -4703,7 +4703,7 @@
           </a:bodyPr>
           <a:p>
             <a:pPr algn="ctr"/>
-            <a:endParaRPr b="0" lang="en-GB" sz="3200" spc="-1" strike="noStrike">
+            <a:endParaRPr b="0" lang="en-US" sz="3200" spc="-1" strike="noStrike">
               <a:latin typeface="Arial"/>
             </a:endParaRPr>
           </a:p>
@@ -4756,7 +4756,7 @@
           </a:bodyPr>
           <a:p>
             <a:pPr algn="ctr"/>
-            <a:endParaRPr b="0" lang="en-GB" sz="4400" spc="-1" strike="noStrike">
+            <a:endParaRPr b="0" lang="en-US" sz="4400" spc="-1" strike="noStrike">
               <a:latin typeface="Arial"/>
             </a:endParaRPr>
           </a:p>
@@ -4786,7 +4786,7 @@
             <a:normAutofit/>
           </a:bodyPr>
           <a:p>
-            <a:endParaRPr b="0" lang="en-GB" sz="3200" spc="-1" strike="noStrike">
+            <a:endParaRPr b="0" lang="en-US" sz="3200" spc="-1" strike="noStrike">
               <a:latin typeface="Arial"/>
             </a:endParaRPr>
           </a:p>
@@ -4816,7 +4816,7 @@
             <a:normAutofit/>
           </a:bodyPr>
           <a:p>
-            <a:endParaRPr b="0" lang="en-GB" sz="3200" spc="-1" strike="noStrike">
+            <a:endParaRPr b="0" lang="en-US" sz="3200" spc="-1" strike="noStrike">
               <a:latin typeface="Arial"/>
             </a:endParaRPr>
           </a:p>
@@ -4846,7 +4846,7 @@
             <a:normAutofit/>
           </a:bodyPr>
           <a:p>
-            <a:endParaRPr b="0" lang="en-GB" sz="3200" spc="-1" strike="noStrike">
+            <a:endParaRPr b="0" lang="en-US" sz="3200" spc="-1" strike="noStrike">
               <a:latin typeface="Arial"/>
             </a:endParaRPr>
           </a:p>
@@ -4899,7 +4899,7 @@
           </a:bodyPr>
           <a:p>
             <a:pPr algn="ctr"/>
-            <a:endParaRPr b="0" lang="en-GB" sz="4400" spc="-1" strike="noStrike">
+            <a:endParaRPr b="0" lang="en-US" sz="4400" spc="-1" strike="noStrike">
               <a:latin typeface="Arial"/>
             </a:endParaRPr>
           </a:p>
@@ -4929,7 +4929,7 @@
             <a:normAutofit/>
           </a:bodyPr>
           <a:p>
-            <a:endParaRPr b="0" lang="en-GB" sz="3200" spc="-1" strike="noStrike">
+            <a:endParaRPr b="0" lang="en-US" sz="3200" spc="-1" strike="noStrike">
               <a:latin typeface="Arial"/>
             </a:endParaRPr>
           </a:p>
@@ -4959,7 +4959,7 @@
             <a:normAutofit/>
           </a:bodyPr>
           <a:p>
-            <a:endParaRPr b="0" lang="en-GB" sz="3200" spc="-1" strike="noStrike">
+            <a:endParaRPr b="0" lang="en-US" sz="3200" spc="-1" strike="noStrike">
               <a:latin typeface="Arial"/>
             </a:endParaRPr>
           </a:p>
@@ -4989,7 +4989,7 @@
             <a:normAutofit/>
           </a:bodyPr>
           <a:p>
-            <a:endParaRPr b="0" lang="en-GB" sz="3200" spc="-1" strike="noStrike">
+            <a:endParaRPr b="0" lang="en-US" sz="3200" spc="-1" strike="noStrike">
               <a:latin typeface="Arial"/>
             </a:endParaRPr>
           </a:p>
@@ -5042,7 +5042,7 @@
           </a:bodyPr>
           <a:p>
             <a:pPr algn="ctr"/>
-            <a:endParaRPr b="0" lang="en-GB" sz="4400" spc="-1" strike="noStrike">
+            <a:endParaRPr b="0" lang="en-US" sz="4400" spc="-1" strike="noStrike">
               <a:latin typeface="Arial"/>
             </a:endParaRPr>
           </a:p>
@@ -5072,7 +5072,7 @@
             <a:normAutofit/>
           </a:bodyPr>
           <a:p>
-            <a:endParaRPr b="0" lang="en-GB" sz="3200" spc="-1" strike="noStrike">
+            <a:endParaRPr b="0" lang="en-US" sz="3200" spc="-1" strike="noStrike">
               <a:latin typeface="Arial"/>
             </a:endParaRPr>
           </a:p>
@@ -5102,7 +5102,7 @@
             <a:normAutofit/>
           </a:bodyPr>
           <a:p>
-            <a:endParaRPr b="0" lang="en-GB" sz="3200" spc="-1" strike="noStrike">
+            <a:endParaRPr b="0" lang="en-US" sz="3200" spc="-1" strike="noStrike">
               <a:latin typeface="Arial"/>
             </a:endParaRPr>
           </a:p>
@@ -5132,7 +5132,7 @@
             <a:normAutofit/>
           </a:bodyPr>
           <a:p>
-            <a:endParaRPr b="0" lang="en-GB" sz="3200" spc="-1" strike="noStrike">
+            <a:endParaRPr b="0" lang="en-US" sz="3200" spc="-1" strike="noStrike">
               <a:latin typeface="Arial"/>
             </a:endParaRPr>
           </a:p>
@@ -5185,7 +5185,7 @@
           </a:bodyPr>
           <a:p>
             <a:pPr algn="ctr"/>
-            <a:endParaRPr b="0" lang="en-GB" sz="4400" spc="-1" strike="noStrike">
+            <a:endParaRPr b="0" lang="en-US" sz="4400" spc="-1" strike="noStrike">
               <a:latin typeface="Arial"/>
             </a:endParaRPr>
           </a:p>
@@ -5215,7 +5215,7 @@
             <a:normAutofit/>
           </a:bodyPr>
           <a:p>
-            <a:endParaRPr b="0" lang="en-GB" sz="3200" spc="-1" strike="noStrike">
+            <a:endParaRPr b="0" lang="en-US" sz="3200" spc="-1" strike="noStrike">
               <a:latin typeface="Arial"/>
             </a:endParaRPr>
           </a:p>
@@ -5245,7 +5245,7 @@
             <a:normAutofit/>
           </a:bodyPr>
           <a:p>
-            <a:endParaRPr b="0" lang="en-GB" sz="3200" spc="-1" strike="noStrike">
+            <a:endParaRPr b="0" lang="en-US" sz="3200" spc="-1" strike="noStrike">
               <a:latin typeface="Arial"/>
             </a:endParaRPr>
           </a:p>
@@ -5298,7 +5298,7 @@
           </a:bodyPr>
           <a:p>
             <a:pPr algn="ctr"/>
-            <a:endParaRPr b="0" lang="en-GB" sz="4400" spc="-1" strike="noStrike">
+            <a:endParaRPr b="0" lang="en-US" sz="4400" spc="-1" strike="noStrike">
               <a:latin typeface="Arial"/>
             </a:endParaRPr>
           </a:p>
@@ -5328,7 +5328,7 @@
             <a:normAutofit/>
           </a:bodyPr>
           <a:p>
-            <a:endParaRPr b="0" lang="en-GB" sz="3200" spc="-1" strike="noStrike">
+            <a:endParaRPr b="0" lang="en-US" sz="3200" spc="-1" strike="noStrike">
               <a:latin typeface="Arial"/>
             </a:endParaRPr>
           </a:p>
@@ -5358,7 +5358,7 @@
             <a:normAutofit/>
           </a:bodyPr>
           <a:p>
-            <a:endParaRPr b="0" lang="en-GB" sz="3200" spc="-1" strike="noStrike">
+            <a:endParaRPr b="0" lang="en-US" sz="3200" spc="-1" strike="noStrike">
               <a:latin typeface="Arial"/>
             </a:endParaRPr>
           </a:p>
@@ -5388,7 +5388,7 @@
             <a:normAutofit/>
           </a:bodyPr>
           <a:p>
-            <a:endParaRPr b="0" lang="en-GB" sz="3200" spc="-1" strike="noStrike">
+            <a:endParaRPr b="0" lang="en-US" sz="3200" spc="-1" strike="noStrike">
               <a:latin typeface="Arial"/>
             </a:endParaRPr>
           </a:p>
@@ -5418,7 +5418,7 @@
             <a:normAutofit/>
           </a:bodyPr>
           <a:p>
-            <a:endParaRPr b="0" lang="en-GB" sz="3200" spc="-1" strike="noStrike">
+            <a:endParaRPr b="0" lang="en-US" sz="3200" spc="-1" strike="noStrike">
               <a:latin typeface="Arial"/>
             </a:endParaRPr>
           </a:p>
@@ -5471,7 +5471,7 @@
           </a:bodyPr>
           <a:p>
             <a:pPr algn="ctr"/>
-            <a:endParaRPr b="0" lang="en-GB" sz="4400" spc="-1" strike="noStrike">
+            <a:endParaRPr b="0" lang="en-US" sz="4400" spc="-1" strike="noStrike">
               <a:latin typeface="Arial"/>
             </a:endParaRPr>
           </a:p>
@@ -5501,7 +5501,7 @@
             <a:normAutofit/>
           </a:bodyPr>
           <a:p>
-            <a:endParaRPr b="0" lang="en-GB" sz="3200" spc="-1" strike="noStrike">
+            <a:endParaRPr b="0" lang="en-US" sz="3200" spc="-1" strike="noStrike">
               <a:latin typeface="Arial"/>
             </a:endParaRPr>
           </a:p>
@@ -5531,7 +5531,7 @@
             <a:normAutofit/>
           </a:bodyPr>
           <a:p>
-            <a:endParaRPr b="0" lang="en-GB" sz="3200" spc="-1" strike="noStrike">
+            <a:endParaRPr b="0" lang="en-US" sz="3200" spc="-1" strike="noStrike">
               <a:latin typeface="Arial"/>
             </a:endParaRPr>
           </a:p>
@@ -5561,7 +5561,7 @@
             <a:normAutofit/>
           </a:bodyPr>
           <a:p>
-            <a:endParaRPr b="0" lang="en-GB" sz="3200" spc="-1" strike="noStrike">
+            <a:endParaRPr b="0" lang="en-US" sz="3200" spc="-1" strike="noStrike">
               <a:latin typeface="Arial"/>
             </a:endParaRPr>
           </a:p>
@@ -5591,7 +5591,7 @@
             <a:normAutofit/>
           </a:bodyPr>
           <a:p>
-            <a:endParaRPr b="0" lang="en-GB" sz="3200" spc="-1" strike="noStrike">
+            <a:endParaRPr b="0" lang="en-US" sz="3200" spc="-1" strike="noStrike">
               <a:latin typeface="Arial"/>
             </a:endParaRPr>
           </a:p>
@@ -5621,7 +5621,7 @@
             <a:normAutofit/>
           </a:bodyPr>
           <a:p>
-            <a:endParaRPr b="0" lang="en-GB" sz="3200" spc="-1" strike="noStrike">
+            <a:endParaRPr b="0" lang="en-US" sz="3200" spc="-1" strike="noStrike">
               <a:latin typeface="Arial"/>
             </a:endParaRPr>
           </a:p>
@@ -5651,7 +5651,7 @@
             <a:normAutofit/>
           </a:bodyPr>
           <a:p>
-            <a:endParaRPr b="0" lang="en-GB" sz="3200" spc="-1" strike="noStrike">
+            <a:endParaRPr b="0" lang="en-US" sz="3200" spc="-1" strike="noStrike">
               <a:latin typeface="Arial"/>
             </a:endParaRPr>
           </a:p>
@@ -5726,7 +5726,7 @@
           </a:bodyPr>
           <a:p>
             <a:pPr algn="ctr"/>
-            <a:endParaRPr b="0" lang="en-GB" sz="4400" spc="-1" strike="noStrike">
+            <a:endParaRPr b="0" lang="en-US" sz="4400" spc="-1" strike="noStrike">
               <a:latin typeface="Arial"/>
             </a:endParaRPr>
           </a:p>
@@ -5779,7 +5779,7 @@
           </a:bodyPr>
           <a:p>
             <a:pPr algn="ctr"/>
-            <a:endParaRPr b="0" lang="en-GB" sz="4400" spc="-1" strike="noStrike">
+            <a:endParaRPr b="0" lang="en-US" sz="4400" spc="-1" strike="noStrike">
               <a:latin typeface="Arial"/>
             </a:endParaRPr>
           </a:p>
@@ -5810,7 +5810,7 @@
           </a:bodyPr>
           <a:p>
             <a:pPr algn="ctr"/>
-            <a:endParaRPr b="0" lang="en-GB" sz="3200" spc="-1" strike="noStrike">
+            <a:endParaRPr b="0" lang="en-US" sz="3200" spc="-1" strike="noStrike">
               <a:latin typeface="Arial"/>
             </a:endParaRPr>
           </a:p>
@@ -5863,7 +5863,7 @@
           </a:bodyPr>
           <a:p>
             <a:pPr algn="ctr"/>
-            <a:endParaRPr b="0" lang="en-GB" sz="4400" spc="-1" strike="noStrike">
+            <a:endParaRPr b="0" lang="en-US" sz="4400" spc="-1" strike="noStrike">
               <a:latin typeface="Arial"/>
             </a:endParaRPr>
           </a:p>
@@ -5893,7 +5893,7 @@
             <a:normAutofit/>
           </a:bodyPr>
           <a:p>
-            <a:endParaRPr b="0" lang="en-GB" sz="3200" spc="-1" strike="noStrike">
+            <a:endParaRPr b="0" lang="en-US" sz="3200" spc="-1" strike="noStrike">
               <a:latin typeface="Arial"/>
             </a:endParaRPr>
           </a:p>
@@ -5946,7 +5946,7 @@
           </a:bodyPr>
           <a:p>
             <a:pPr algn="ctr"/>
-            <a:endParaRPr b="0" lang="en-GB" sz="4400" spc="-1" strike="noStrike">
+            <a:endParaRPr b="0" lang="en-US" sz="4400" spc="-1" strike="noStrike">
               <a:latin typeface="Arial"/>
             </a:endParaRPr>
           </a:p>
@@ -5976,7 +5976,7 @@
             <a:normAutofit/>
           </a:bodyPr>
           <a:p>
-            <a:endParaRPr b="0" lang="en-GB" sz="3200" spc="-1" strike="noStrike">
+            <a:endParaRPr b="0" lang="en-US" sz="3200" spc="-1" strike="noStrike">
               <a:latin typeface="Arial"/>
             </a:endParaRPr>
           </a:p>
@@ -6006,7 +6006,7 @@
             <a:normAutofit/>
           </a:bodyPr>
           <a:p>
-            <a:endParaRPr b="0" lang="en-GB" sz="3200" spc="-1" strike="noStrike">
+            <a:endParaRPr b="0" lang="en-US" sz="3200" spc="-1" strike="noStrike">
               <a:latin typeface="Arial"/>
             </a:endParaRPr>
           </a:p>
@@ -6059,7 +6059,7 @@
           </a:bodyPr>
           <a:p>
             <a:pPr algn="ctr"/>
-            <a:endParaRPr b="0" lang="en-GB" sz="4400" spc="-1" strike="noStrike">
+            <a:endParaRPr b="0" lang="en-US" sz="4400" spc="-1" strike="noStrike">
               <a:latin typeface="Arial"/>
             </a:endParaRPr>
           </a:p>
@@ -6112,7 +6112,7 @@
           </a:bodyPr>
           <a:p>
             <a:pPr algn="ctr"/>
-            <a:endParaRPr b="0" lang="en-GB" sz="3200" spc="-1" strike="noStrike">
+            <a:endParaRPr b="0" lang="en-US" sz="3200" spc="-1" strike="noStrike">
               <a:latin typeface="Arial"/>
             </a:endParaRPr>
           </a:p>
@@ -6165,7 +6165,7 @@
           </a:bodyPr>
           <a:p>
             <a:pPr algn="ctr"/>
-            <a:endParaRPr b="0" lang="en-GB" sz="4400" spc="-1" strike="noStrike">
+            <a:endParaRPr b="0" lang="en-US" sz="4400" spc="-1" strike="noStrike">
               <a:latin typeface="Arial"/>
             </a:endParaRPr>
           </a:p>
@@ -6195,7 +6195,7 @@
             <a:normAutofit/>
           </a:bodyPr>
           <a:p>
-            <a:endParaRPr b="0" lang="en-GB" sz="3200" spc="-1" strike="noStrike">
+            <a:endParaRPr b="0" lang="en-US" sz="3200" spc="-1" strike="noStrike">
               <a:latin typeface="Arial"/>
             </a:endParaRPr>
           </a:p>
@@ -6225,7 +6225,7 @@
             <a:normAutofit/>
           </a:bodyPr>
           <a:p>
-            <a:endParaRPr b="0" lang="en-GB" sz="3200" spc="-1" strike="noStrike">
+            <a:endParaRPr b="0" lang="en-US" sz="3200" spc="-1" strike="noStrike">
               <a:latin typeface="Arial"/>
             </a:endParaRPr>
           </a:p>
@@ -6255,7 +6255,7 @@
             <a:normAutofit/>
           </a:bodyPr>
           <a:p>
-            <a:endParaRPr b="0" lang="en-GB" sz="3200" spc="-1" strike="noStrike">
+            <a:endParaRPr b="0" lang="en-US" sz="3200" spc="-1" strike="noStrike">
               <a:latin typeface="Arial"/>
             </a:endParaRPr>
           </a:p>
@@ -6308,7 +6308,7 @@
           </a:bodyPr>
           <a:p>
             <a:pPr algn="ctr"/>
-            <a:endParaRPr b="0" lang="en-GB" sz="4400" spc="-1" strike="noStrike">
+            <a:endParaRPr b="0" lang="en-US" sz="4400" spc="-1" strike="noStrike">
               <a:latin typeface="Arial"/>
             </a:endParaRPr>
           </a:p>
@@ -6338,7 +6338,7 @@
             <a:normAutofit/>
           </a:bodyPr>
           <a:p>
-            <a:endParaRPr b="0" lang="en-GB" sz="3200" spc="-1" strike="noStrike">
+            <a:endParaRPr b="0" lang="en-US" sz="3200" spc="-1" strike="noStrike">
               <a:latin typeface="Arial"/>
             </a:endParaRPr>
           </a:p>
@@ -6368,7 +6368,7 @@
             <a:normAutofit/>
           </a:bodyPr>
           <a:p>
-            <a:endParaRPr b="0" lang="en-GB" sz="3200" spc="-1" strike="noStrike">
+            <a:endParaRPr b="0" lang="en-US" sz="3200" spc="-1" strike="noStrike">
               <a:latin typeface="Arial"/>
             </a:endParaRPr>
           </a:p>
@@ -6398,7 +6398,7 @@
             <a:normAutofit/>
           </a:bodyPr>
           <a:p>
-            <a:endParaRPr b="0" lang="en-GB" sz="3200" spc="-1" strike="noStrike">
+            <a:endParaRPr b="0" lang="en-US" sz="3200" spc="-1" strike="noStrike">
               <a:latin typeface="Arial"/>
             </a:endParaRPr>
           </a:p>
@@ -6451,7 +6451,7 @@
           </a:bodyPr>
           <a:p>
             <a:pPr algn="ctr"/>
-            <a:endParaRPr b="0" lang="en-GB" sz="4400" spc="-1" strike="noStrike">
+            <a:endParaRPr b="0" lang="en-US" sz="4400" spc="-1" strike="noStrike">
               <a:latin typeface="Arial"/>
             </a:endParaRPr>
           </a:p>
@@ -6481,7 +6481,7 @@
             <a:normAutofit/>
           </a:bodyPr>
           <a:p>
-            <a:endParaRPr b="0" lang="en-GB" sz="3200" spc="-1" strike="noStrike">
+            <a:endParaRPr b="0" lang="en-US" sz="3200" spc="-1" strike="noStrike">
               <a:latin typeface="Arial"/>
             </a:endParaRPr>
           </a:p>
@@ -6511,7 +6511,7 @@
             <a:normAutofit/>
           </a:bodyPr>
           <a:p>
-            <a:endParaRPr b="0" lang="en-GB" sz="3200" spc="-1" strike="noStrike">
+            <a:endParaRPr b="0" lang="en-US" sz="3200" spc="-1" strike="noStrike">
               <a:latin typeface="Arial"/>
             </a:endParaRPr>
           </a:p>
@@ -6541,7 +6541,7 @@
             <a:normAutofit/>
           </a:bodyPr>
           <a:p>
-            <a:endParaRPr b="0" lang="en-GB" sz="3200" spc="-1" strike="noStrike">
+            <a:endParaRPr b="0" lang="en-US" sz="3200" spc="-1" strike="noStrike">
               <a:latin typeface="Arial"/>
             </a:endParaRPr>
           </a:p>
@@ -6594,7 +6594,7 @@
           </a:bodyPr>
           <a:p>
             <a:pPr algn="ctr"/>
-            <a:endParaRPr b="0" lang="en-GB" sz="4400" spc="-1" strike="noStrike">
+            <a:endParaRPr b="0" lang="en-US" sz="4400" spc="-1" strike="noStrike">
               <a:latin typeface="Arial"/>
             </a:endParaRPr>
           </a:p>
@@ -6624,7 +6624,7 @@
             <a:normAutofit/>
           </a:bodyPr>
           <a:p>
-            <a:endParaRPr b="0" lang="en-GB" sz="3200" spc="-1" strike="noStrike">
+            <a:endParaRPr b="0" lang="en-US" sz="3200" spc="-1" strike="noStrike">
               <a:latin typeface="Arial"/>
             </a:endParaRPr>
           </a:p>
@@ -6654,7 +6654,7 @@
             <a:normAutofit/>
           </a:bodyPr>
           <a:p>
-            <a:endParaRPr b="0" lang="en-GB" sz="3200" spc="-1" strike="noStrike">
+            <a:endParaRPr b="0" lang="en-US" sz="3200" spc="-1" strike="noStrike">
               <a:latin typeface="Arial"/>
             </a:endParaRPr>
           </a:p>
@@ -6707,7 +6707,7 @@
           </a:bodyPr>
           <a:p>
             <a:pPr algn="ctr"/>
-            <a:endParaRPr b="0" lang="en-GB" sz="4400" spc="-1" strike="noStrike">
+            <a:endParaRPr b="0" lang="en-US" sz="4400" spc="-1" strike="noStrike">
               <a:latin typeface="Arial"/>
             </a:endParaRPr>
           </a:p>
@@ -6737,7 +6737,7 @@
             <a:normAutofit/>
           </a:bodyPr>
           <a:p>
-            <a:endParaRPr b="0" lang="en-GB" sz="3200" spc="-1" strike="noStrike">
+            <a:endParaRPr b="0" lang="en-US" sz="3200" spc="-1" strike="noStrike">
               <a:latin typeface="Arial"/>
             </a:endParaRPr>
           </a:p>
@@ -6767,7 +6767,7 @@
             <a:normAutofit/>
           </a:bodyPr>
           <a:p>
-            <a:endParaRPr b="0" lang="en-GB" sz="3200" spc="-1" strike="noStrike">
+            <a:endParaRPr b="0" lang="en-US" sz="3200" spc="-1" strike="noStrike">
               <a:latin typeface="Arial"/>
             </a:endParaRPr>
           </a:p>
@@ -6797,7 +6797,7 @@
             <a:normAutofit/>
           </a:bodyPr>
           <a:p>
-            <a:endParaRPr b="0" lang="en-GB" sz="3200" spc="-1" strike="noStrike">
+            <a:endParaRPr b="0" lang="en-US" sz="3200" spc="-1" strike="noStrike">
               <a:latin typeface="Arial"/>
             </a:endParaRPr>
           </a:p>
@@ -6827,7 +6827,7 @@
             <a:normAutofit/>
           </a:bodyPr>
           <a:p>
-            <a:endParaRPr b="0" lang="en-GB" sz="3200" spc="-1" strike="noStrike">
+            <a:endParaRPr b="0" lang="en-US" sz="3200" spc="-1" strike="noStrike">
               <a:latin typeface="Arial"/>
             </a:endParaRPr>
           </a:p>
@@ -6880,7 +6880,7 @@
           </a:bodyPr>
           <a:p>
             <a:pPr algn="ctr"/>
-            <a:endParaRPr b="0" lang="en-GB" sz="3200" spc="-1" strike="noStrike">
+            <a:endParaRPr b="0" lang="en-US" sz="3200" spc="-1" strike="noStrike">
               <a:latin typeface="Arial"/>
             </a:endParaRPr>
           </a:p>
@@ -6933,7 +6933,7 @@
           </a:bodyPr>
           <a:p>
             <a:pPr algn="ctr"/>
-            <a:endParaRPr b="0" lang="en-GB" sz="4400" spc="-1" strike="noStrike">
+            <a:endParaRPr b="0" lang="en-US" sz="4400" spc="-1" strike="noStrike">
               <a:latin typeface="Arial"/>
             </a:endParaRPr>
           </a:p>
@@ -6963,7 +6963,7 @@
             <a:normAutofit/>
           </a:bodyPr>
           <a:p>
-            <a:endParaRPr b="0" lang="en-GB" sz="3200" spc="-1" strike="noStrike">
+            <a:endParaRPr b="0" lang="en-US" sz="3200" spc="-1" strike="noStrike">
               <a:latin typeface="Arial"/>
             </a:endParaRPr>
           </a:p>
@@ -6993,7 +6993,7 @@
             <a:normAutofit/>
           </a:bodyPr>
           <a:p>
-            <a:endParaRPr b="0" lang="en-GB" sz="3200" spc="-1" strike="noStrike">
+            <a:endParaRPr b="0" lang="en-US" sz="3200" spc="-1" strike="noStrike">
               <a:latin typeface="Arial"/>
             </a:endParaRPr>
           </a:p>
@@ -7023,7 +7023,7 @@
             <a:normAutofit/>
           </a:bodyPr>
           <a:p>
-            <a:endParaRPr b="0" lang="en-GB" sz="3200" spc="-1" strike="noStrike">
+            <a:endParaRPr b="0" lang="en-US" sz="3200" spc="-1" strike="noStrike">
               <a:latin typeface="Arial"/>
             </a:endParaRPr>
           </a:p>
@@ -7053,7 +7053,7 @@
             <a:normAutofit/>
           </a:bodyPr>
           <a:p>
-            <a:endParaRPr b="0" lang="en-GB" sz="3200" spc="-1" strike="noStrike">
+            <a:endParaRPr b="0" lang="en-US" sz="3200" spc="-1" strike="noStrike">
               <a:latin typeface="Arial"/>
             </a:endParaRPr>
           </a:p>
@@ -7083,7 +7083,7 @@
             <a:normAutofit/>
           </a:bodyPr>
           <a:p>
-            <a:endParaRPr b="0" lang="en-GB" sz="3200" spc="-1" strike="noStrike">
+            <a:endParaRPr b="0" lang="en-US" sz="3200" spc="-1" strike="noStrike">
               <a:latin typeface="Arial"/>
             </a:endParaRPr>
           </a:p>
@@ -7113,7 +7113,7 @@
             <a:normAutofit/>
           </a:bodyPr>
           <a:p>
-            <a:endParaRPr b="0" lang="en-GB" sz="3200" spc="-1" strike="noStrike">
+            <a:endParaRPr b="0" lang="en-US" sz="3200" spc="-1" strike="noStrike">
               <a:latin typeface="Arial"/>
             </a:endParaRPr>
           </a:p>
@@ -7166,7 +7166,7 @@
           </a:bodyPr>
           <a:p>
             <a:pPr algn="ctr"/>
-            <a:endParaRPr b="0" lang="en-GB" sz="4400" spc="-1" strike="noStrike">
+            <a:endParaRPr b="0" lang="en-US" sz="4400" spc="-1" strike="noStrike">
               <a:latin typeface="Arial"/>
             </a:endParaRPr>
           </a:p>
@@ -7196,7 +7196,7 @@
             <a:normAutofit/>
           </a:bodyPr>
           <a:p>
-            <a:endParaRPr b="0" lang="en-GB" sz="3200" spc="-1" strike="noStrike">
+            <a:endParaRPr b="0" lang="en-US" sz="3200" spc="-1" strike="noStrike">
               <a:latin typeface="Arial"/>
             </a:endParaRPr>
           </a:p>
@@ -7226,7 +7226,7 @@
             <a:normAutofit/>
           </a:bodyPr>
           <a:p>
-            <a:endParaRPr b="0" lang="en-GB" sz="3200" spc="-1" strike="noStrike">
+            <a:endParaRPr b="0" lang="en-US" sz="3200" spc="-1" strike="noStrike">
               <a:latin typeface="Arial"/>
             </a:endParaRPr>
           </a:p>
@@ -7256,7 +7256,7 @@
             <a:normAutofit/>
           </a:bodyPr>
           <a:p>
-            <a:endParaRPr b="0" lang="en-GB" sz="3200" spc="-1" strike="noStrike">
+            <a:endParaRPr b="0" lang="en-US" sz="3200" spc="-1" strike="noStrike">
               <a:latin typeface="Arial"/>
             </a:endParaRPr>
           </a:p>
@@ -7309,7 +7309,7 @@
           </a:bodyPr>
           <a:p>
             <a:pPr algn="ctr"/>
-            <a:endParaRPr b="0" lang="en-GB" sz="4400" spc="-1" strike="noStrike">
+            <a:endParaRPr b="0" lang="en-US" sz="4400" spc="-1" strike="noStrike">
               <a:latin typeface="Arial"/>
             </a:endParaRPr>
           </a:p>
@@ -7339,7 +7339,7 @@
             <a:normAutofit/>
           </a:bodyPr>
           <a:p>
-            <a:endParaRPr b="0" lang="en-GB" sz="3200" spc="-1" strike="noStrike">
+            <a:endParaRPr b="0" lang="en-US" sz="3200" spc="-1" strike="noStrike">
               <a:latin typeface="Arial"/>
             </a:endParaRPr>
           </a:p>
@@ -7369,7 +7369,7 @@
             <a:normAutofit/>
           </a:bodyPr>
           <a:p>
-            <a:endParaRPr b="0" lang="en-GB" sz="3200" spc="-1" strike="noStrike">
+            <a:endParaRPr b="0" lang="en-US" sz="3200" spc="-1" strike="noStrike">
               <a:latin typeface="Arial"/>
             </a:endParaRPr>
           </a:p>
@@ -7399,7 +7399,7 @@
             <a:normAutofit/>
           </a:bodyPr>
           <a:p>
-            <a:endParaRPr b="0" lang="en-GB" sz="3200" spc="-1" strike="noStrike">
+            <a:endParaRPr b="0" lang="en-US" sz="3200" spc="-1" strike="noStrike">
               <a:latin typeface="Arial"/>
             </a:endParaRPr>
           </a:p>
@@ -7452,7 +7452,7 @@
           </a:bodyPr>
           <a:p>
             <a:pPr algn="ctr"/>
-            <a:endParaRPr b="0" lang="en-GB" sz="4400" spc="-1" strike="noStrike">
+            <a:endParaRPr b="0" lang="en-US" sz="4400" spc="-1" strike="noStrike">
               <a:latin typeface="Arial"/>
             </a:endParaRPr>
           </a:p>
@@ -7482,7 +7482,7 @@
             <a:normAutofit/>
           </a:bodyPr>
           <a:p>
-            <a:endParaRPr b="0" lang="en-GB" sz="3200" spc="-1" strike="noStrike">
+            <a:endParaRPr b="0" lang="en-US" sz="3200" spc="-1" strike="noStrike">
               <a:latin typeface="Arial"/>
             </a:endParaRPr>
           </a:p>
@@ -7512,7 +7512,7 @@
             <a:normAutofit/>
           </a:bodyPr>
           <a:p>
-            <a:endParaRPr b="0" lang="en-GB" sz="3200" spc="-1" strike="noStrike">
+            <a:endParaRPr b="0" lang="en-US" sz="3200" spc="-1" strike="noStrike">
               <a:latin typeface="Arial"/>
             </a:endParaRPr>
           </a:p>
@@ -7542,7 +7542,7 @@
             <a:normAutofit/>
           </a:bodyPr>
           <a:p>
-            <a:endParaRPr b="0" lang="en-GB" sz="3200" spc="-1" strike="noStrike">
+            <a:endParaRPr b="0" lang="en-US" sz="3200" spc="-1" strike="noStrike">
               <a:latin typeface="Arial"/>
             </a:endParaRPr>
           </a:p>
@@ -7585,13 +7585,13 @@
         </p:nvPicPr>
         <p:blipFill>
           <a:blip r:embed="rId2"/>
-          <a:srcRect l="0" t="0" r="0" b="24679"/>
+          <a:srcRect l="0" t="0" r="0" b="24677"/>
           <a:stretch/>
         </p:blipFill>
         <p:spPr>
           <a:xfrm>
             <a:off x="0" y="0"/>
-            <a:ext cx="12189240" cy="6855120"/>
+            <a:ext cx="12188880" cy="6854760"/>
           </a:xfrm>
           <a:prstGeom prst="rect">
             <a:avLst/>
@@ -7610,9 +7610,9 @@
         <p:grpSpPr>
           <a:xfrm>
             <a:off x="0" y="2076480"/>
-            <a:ext cx="11520360" cy="4778640"/>
+            <a:ext cx="11520000" cy="4778280"/>
             <a:chOff x="0" y="2076480"/>
-            <a:chExt cx="11520360" cy="4778640"/>
+            <a:chExt cx="11520000" cy="4778280"/>
           </a:xfrm>
         </p:grpSpPr>
         <p:sp>
@@ -7624,7 +7624,7 @@
           <p:spPr>
             <a:xfrm>
               <a:off x="0" y="2076480"/>
-              <a:ext cx="10855440" cy="4778640"/>
+              <a:ext cx="10855080" cy="4778280"/>
             </a:xfrm>
             <a:prstGeom prst="rect">
               <a:avLst/>
@@ -7652,7 +7652,7 @@
           <p:spPr>
             <a:xfrm>
               <a:off x="10170720" y="2076480"/>
-              <a:ext cx="1347480" cy="1009800"/>
+              <a:ext cx="1347120" cy="1009440"/>
             </a:xfrm>
             <a:prstGeom prst="ellipse">
               <a:avLst/>
@@ -7680,7 +7680,7 @@
           <p:spPr>
             <a:xfrm>
               <a:off x="6527880" y="2571840"/>
-              <a:ext cx="4992480" cy="4283280"/>
+              <a:ext cx="4992120" cy="4282920"/>
             </a:xfrm>
             <a:prstGeom prst="rect">
               <a:avLst/>
@@ -7713,7 +7713,7 @@
         <p:spPr>
           <a:xfrm>
             <a:off x="191520" y="188640"/>
-            <a:ext cx="3705480" cy="1402200"/>
+            <a:ext cx="3705120" cy="1401840"/>
           </a:xfrm>
           <a:prstGeom prst="rect">
             <a:avLst/>
@@ -7749,12 +7749,12 @@
           <a:p>
             <a:pPr algn="ctr"/>
             <a:r>
-              <a:rPr b="0" lang="en-GB" sz="4400" spc="-1" strike="noStrike">
+              <a:rPr b="0" lang="en-US" sz="4400" spc="-1" strike="noStrike">
                 <a:latin typeface="Arial"/>
               </a:rPr>
               <a:t>Click to edit the title text format</a:t>
             </a:r>
-            <a:endParaRPr b="0" lang="en-GB" sz="4400" spc="-1" strike="noStrike">
+            <a:endParaRPr b="0" lang="en-US" sz="4400" spc="-1" strike="noStrike">
               <a:latin typeface="Arial"/>
             </a:endParaRPr>
           </a:p>
@@ -7796,12 +7796,12 @@
               <a:buChar char=""/>
             </a:pPr>
             <a:r>
-              <a:rPr b="0" lang="en-GB" sz="3200" spc="-1" strike="noStrike">
+              <a:rPr b="0" lang="en-US" sz="3200" spc="-1" strike="noStrike">
                 <a:latin typeface="Arial"/>
               </a:rPr>
               <a:t>Click to edit the outline text format</a:t>
             </a:r>
-            <a:endParaRPr b="0" lang="en-GB" sz="3200" spc="-1" strike="noStrike">
+            <a:endParaRPr b="0" lang="en-US" sz="3200" spc="-1" strike="noStrike">
               <a:latin typeface="Arial"/>
             </a:endParaRPr>
           </a:p>
@@ -7818,12 +7818,12 @@
               <a:buChar char=""/>
             </a:pPr>
             <a:r>
-              <a:rPr b="0" lang="en-GB" sz="2800" spc="-1" strike="noStrike">
+              <a:rPr b="0" lang="en-US" sz="2800" spc="-1" strike="noStrike">
                 <a:latin typeface="Arial"/>
               </a:rPr>
               <a:t>Second Outline Level</a:t>
             </a:r>
-            <a:endParaRPr b="0" lang="en-GB" sz="2800" spc="-1" strike="noStrike">
+            <a:endParaRPr b="0" lang="en-US" sz="2800" spc="-1" strike="noStrike">
               <a:latin typeface="Arial"/>
             </a:endParaRPr>
           </a:p>
@@ -7840,12 +7840,12 @@
               <a:buChar char=""/>
             </a:pPr>
             <a:r>
-              <a:rPr b="0" lang="en-GB" sz="2400" spc="-1" strike="noStrike">
+              <a:rPr b="0" lang="en-US" sz="2400" spc="-1" strike="noStrike">
                 <a:latin typeface="Arial"/>
               </a:rPr>
               <a:t>Third Outline Level</a:t>
             </a:r>
-            <a:endParaRPr b="0" lang="en-GB" sz="2400" spc="-1" strike="noStrike">
+            <a:endParaRPr b="0" lang="en-US" sz="2400" spc="-1" strike="noStrike">
               <a:latin typeface="Arial"/>
             </a:endParaRPr>
           </a:p>
@@ -7862,12 +7862,12 @@
               <a:buChar char=""/>
             </a:pPr>
             <a:r>
-              <a:rPr b="0" lang="en-GB" sz="2000" spc="-1" strike="noStrike">
+              <a:rPr b="0" lang="en-US" sz="2000" spc="-1" strike="noStrike">
                 <a:latin typeface="Arial"/>
               </a:rPr>
               <a:t>Fourth Outline Level</a:t>
             </a:r>
-            <a:endParaRPr b="0" lang="en-GB" sz="2000" spc="-1" strike="noStrike">
+            <a:endParaRPr b="0" lang="en-US" sz="2000" spc="-1" strike="noStrike">
               <a:latin typeface="Arial"/>
             </a:endParaRPr>
           </a:p>
@@ -7884,12 +7884,12 @@
               <a:buChar char=""/>
             </a:pPr>
             <a:r>
-              <a:rPr b="0" lang="en-GB" sz="2000" spc="-1" strike="noStrike">
+              <a:rPr b="0" lang="en-US" sz="2000" spc="-1" strike="noStrike">
                 <a:latin typeface="Arial"/>
               </a:rPr>
               <a:t>Fifth Outline Level</a:t>
             </a:r>
-            <a:endParaRPr b="0" lang="en-GB" sz="2000" spc="-1" strike="noStrike">
+            <a:endParaRPr b="0" lang="en-US" sz="2000" spc="-1" strike="noStrike">
               <a:latin typeface="Arial"/>
             </a:endParaRPr>
           </a:p>
@@ -7906,12 +7906,12 @@
               <a:buChar char=""/>
             </a:pPr>
             <a:r>
-              <a:rPr b="0" lang="en-GB" sz="2000" spc="-1" strike="noStrike">
+              <a:rPr b="0" lang="en-US" sz="2000" spc="-1" strike="noStrike">
                 <a:latin typeface="Arial"/>
               </a:rPr>
               <a:t>Sixth Outline Level</a:t>
             </a:r>
-            <a:endParaRPr b="0" lang="en-GB" sz="2000" spc="-1" strike="noStrike">
+            <a:endParaRPr b="0" lang="en-US" sz="2000" spc="-1" strike="noStrike">
               <a:latin typeface="Arial"/>
             </a:endParaRPr>
           </a:p>
@@ -7928,12 +7928,12 @@
               <a:buChar char=""/>
             </a:pPr>
             <a:r>
-              <a:rPr b="0" lang="en-GB" sz="2000" spc="-1" strike="noStrike">
+              <a:rPr b="0" lang="en-US" sz="2000" spc="-1" strike="noStrike">
                 <a:latin typeface="Arial"/>
               </a:rPr>
               <a:t>Seventh Outline Level</a:t>
             </a:r>
-            <a:endParaRPr b="0" lang="en-GB" sz="2000" spc="-1" strike="noStrike">
+            <a:endParaRPr b="0" lang="en-US" sz="2000" spc="-1" strike="noStrike">
               <a:latin typeface="Arial"/>
             </a:endParaRPr>
           </a:p>
@@ -7992,9 +7992,9 @@
         <p:grpSpPr>
           <a:xfrm>
             <a:off x="0" y="857160"/>
-            <a:ext cx="11520360" cy="5997960"/>
+            <a:ext cx="11520000" cy="5997600"/>
             <a:chOff x="0" y="857160"/>
-            <a:chExt cx="11520360" cy="5997960"/>
+            <a:chExt cx="11520000" cy="5997600"/>
           </a:xfrm>
         </p:grpSpPr>
         <p:sp>
@@ -8006,7 +8006,7 @@
           <p:spPr>
             <a:xfrm>
               <a:off x="0" y="857160"/>
-              <a:ext cx="10855800" cy="5997960"/>
+              <a:ext cx="10855440" cy="5997600"/>
             </a:xfrm>
             <a:prstGeom prst="rect">
               <a:avLst/>
@@ -8034,7 +8034,7 @@
           <p:spPr>
             <a:xfrm>
               <a:off x="10171080" y="858240"/>
-              <a:ext cx="1346400" cy="1266840"/>
+              <a:ext cx="1346040" cy="1266480"/>
             </a:xfrm>
             <a:prstGeom prst="ellipse">
               <a:avLst/>
@@ -8062,7 +8062,7 @@
           <p:spPr>
             <a:xfrm>
               <a:off x="6527520" y="1478880"/>
-              <a:ext cx="4992840" cy="5376240"/>
+              <a:ext cx="4992480" cy="5375880"/>
             </a:xfrm>
             <a:prstGeom prst="rect">
               <a:avLst/>
@@ -8095,7 +8095,7 @@
         <p:spPr>
           <a:xfrm>
             <a:off x="119160" y="116640"/>
-            <a:ext cx="392400" cy="393840"/>
+            <a:ext cx="392040" cy="393480"/>
           </a:xfrm>
           <a:prstGeom prst="rect">
             <a:avLst/>
@@ -8130,12 +8130,12 @@
           </a:bodyPr>
           <a:p>
             <a:r>
-              <a:rPr b="0" lang="en-GB" sz="1800" spc="-1" strike="noStrike">
+              <a:rPr b="0" lang="en-US" sz="1800" spc="-1" strike="noStrike">
                 <a:latin typeface="Arial"/>
               </a:rPr>
               <a:t>Click to edit the title text format</a:t>
             </a:r>
-            <a:endParaRPr b="0" lang="en-GB" sz="1800" spc="-1" strike="noStrike">
+            <a:endParaRPr b="0" lang="en-US" sz="1800" spc="-1" strike="noStrike">
               <a:latin typeface="Arial"/>
             </a:endParaRPr>
           </a:p>
@@ -8177,12 +8177,12 @@
               <a:buChar char=""/>
             </a:pPr>
             <a:r>
-              <a:rPr b="0" lang="en-GB" sz="1800" spc="-1" strike="noStrike">
+              <a:rPr b="0" lang="en-US" sz="1800" spc="-1" strike="noStrike">
                 <a:latin typeface="Arial"/>
               </a:rPr>
               <a:t>Click to edit the outline text format</a:t>
             </a:r>
-            <a:endParaRPr b="0" lang="en-GB" sz="1800" spc="-1" strike="noStrike">
+            <a:endParaRPr b="0" lang="en-US" sz="1800" spc="-1" strike="noStrike">
               <a:latin typeface="Arial"/>
             </a:endParaRPr>
           </a:p>
@@ -8199,12 +8199,12 @@
               <a:buChar char=""/>
             </a:pPr>
             <a:r>
-              <a:rPr b="0" lang="en-GB" sz="1800" spc="-1" strike="noStrike">
+              <a:rPr b="0" lang="en-US" sz="1800" spc="-1" strike="noStrike">
                 <a:latin typeface="Arial"/>
               </a:rPr>
               <a:t>Second Outline Level</a:t>
             </a:r>
-            <a:endParaRPr b="0" lang="en-GB" sz="1800" spc="-1" strike="noStrike">
+            <a:endParaRPr b="0" lang="en-US" sz="1800" spc="-1" strike="noStrike">
               <a:latin typeface="Arial"/>
             </a:endParaRPr>
           </a:p>
@@ -8221,12 +8221,12 @@
               <a:buChar char=""/>
             </a:pPr>
             <a:r>
-              <a:rPr b="0" lang="en-GB" sz="1800" spc="-1" strike="noStrike">
+              <a:rPr b="0" lang="en-US" sz="1800" spc="-1" strike="noStrike">
                 <a:latin typeface="Arial"/>
               </a:rPr>
               <a:t>Third Outline Level</a:t>
             </a:r>
-            <a:endParaRPr b="0" lang="en-GB" sz="1800" spc="-1" strike="noStrike">
+            <a:endParaRPr b="0" lang="en-US" sz="1800" spc="-1" strike="noStrike">
               <a:latin typeface="Arial"/>
             </a:endParaRPr>
           </a:p>
@@ -8243,12 +8243,12 @@
               <a:buChar char=""/>
             </a:pPr>
             <a:r>
-              <a:rPr b="0" lang="en-GB" sz="1800" spc="-1" strike="noStrike">
+              <a:rPr b="0" lang="en-US" sz="1800" spc="-1" strike="noStrike">
                 <a:latin typeface="Arial"/>
               </a:rPr>
               <a:t>Fourth Outline Level</a:t>
             </a:r>
-            <a:endParaRPr b="0" lang="en-GB" sz="1800" spc="-1" strike="noStrike">
+            <a:endParaRPr b="0" lang="en-US" sz="1800" spc="-1" strike="noStrike">
               <a:latin typeface="Arial"/>
             </a:endParaRPr>
           </a:p>
@@ -8265,12 +8265,12 @@
               <a:buChar char=""/>
             </a:pPr>
             <a:r>
-              <a:rPr b="0" lang="en-GB" sz="1800" spc="-1" strike="noStrike">
+              <a:rPr b="0" lang="en-US" sz="1800" spc="-1" strike="noStrike">
                 <a:latin typeface="Arial"/>
               </a:rPr>
               <a:t>Fifth Outline Level</a:t>
             </a:r>
-            <a:endParaRPr b="0" lang="en-GB" sz="1800" spc="-1" strike="noStrike">
+            <a:endParaRPr b="0" lang="en-US" sz="1800" spc="-1" strike="noStrike">
               <a:latin typeface="Arial"/>
             </a:endParaRPr>
           </a:p>
@@ -8287,12 +8287,12 @@
               <a:buChar char=""/>
             </a:pPr>
             <a:r>
-              <a:rPr b="0" lang="en-GB" sz="1800" spc="-1" strike="noStrike">
+              <a:rPr b="0" lang="en-US" sz="1800" spc="-1" strike="noStrike">
                 <a:latin typeface="Arial"/>
               </a:rPr>
               <a:t>Sixth Outline Level</a:t>
             </a:r>
-            <a:endParaRPr b="0" lang="en-GB" sz="1800" spc="-1" strike="noStrike">
+            <a:endParaRPr b="0" lang="en-US" sz="1800" spc="-1" strike="noStrike">
               <a:latin typeface="Arial"/>
             </a:endParaRPr>
           </a:p>
@@ -8309,12 +8309,12 @@
               <a:buChar char=""/>
             </a:pPr>
             <a:r>
-              <a:rPr b="0" lang="en-GB" sz="1800" spc="-1" strike="noStrike">
+              <a:rPr b="0" lang="en-US" sz="1800" spc="-1" strike="noStrike">
                 <a:latin typeface="Arial"/>
               </a:rPr>
               <a:t>Seventh Outline Level</a:t>
             </a:r>
-            <a:endParaRPr b="0" lang="en-GB" sz="1800" spc="-1" strike="noStrike">
+            <a:endParaRPr b="0" lang="en-US" sz="1800" spc="-1" strike="noStrike">
               <a:latin typeface="Arial"/>
             </a:endParaRPr>
           </a:p>
@@ -8356,12 +8356,12 @@
               <a:buChar char=""/>
             </a:pPr>
             <a:r>
-              <a:rPr b="0" lang="en-GB" sz="1800" spc="-1" strike="noStrike">
+              <a:rPr b="0" lang="en-US" sz="1800" spc="-1" strike="noStrike">
                 <a:latin typeface="Arial"/>
               </a:rPr>
               <a:t>Click to edit the outline text format</a:t>
             </a:r>
-            <a:endParaRPr b="0" lang="en-GB" sz="1800" spc="-1" strike="noStrike">
+            <a:endParaRPr b="0" lang="en-US" sz="1800" spc="-1" strike="noStrike">
               <a:latin typeface="Arial"/>
             </a:endParaRPr>
           </a:p>
@@ -8378,12 +8378,12 @@
               <a:buChar char=""/>
             </a:pPr>
             <a:r>
-              <a:rPr b="0" lang="en-GB" sz="1800" spc="-1" strike="noStrike">
+              <a:rPr b="0" lang="en-US" sz="1800" spc="-1" strike="noStrike">
                 <a:latin typeface="Arial"/>
               </a:rPr>
               <a:t>Second Outline Level</a:t>
             </a:r>
-            <a:endParaRPr b="0" lang="en-GB" sz="1800" spc="-1" strike="noStrike">
+            <a:endParaRPr b="0" lang="en-US" sz="1800" spc="-1" strike="noStrike">
               <a:latin typeface="Arial"/>
             </a:endParaRPr>
           </a:p>
@@ -8400,12 +8400,12 @@
               <a:buChar char=""/>
             </a:pPr>
             <a:r>
-              <a:rPr b="0" lang="en-GB" sz="1800" spc="-1" strike="noStrike">
+              <a:rPr b="0" lang="en-US" sz="1800" spc="-1" strike="noStrike">
                 <a:latin typeface="Arial"/>
               </a:rPr>
               <a:t>Third Outline Level</a:t>
             </a:r>
-            <a:endParaRPr b="0" lang="en-GB" sz="1800" spc="-1" strike="noStrike">
+            <a:endParaRPr b="0" lang="en-US" sz="1800" spc="-1" strike="noStrike">
               <a:latin typeface="Arial"/>
             </a:endParaRPr>
           </a:p>
@@ -8422,12 +8422,12 @@
               <a:buChar char=""/>
             </a:pPr>
             <a:r>
-              <a:rPr b="0" lang="en-GB" sz="1800" spc="-1" strike="noStrike">
+              <a:rPr b="0" lang="en-US" sz="1800" spc="-1" strike="noStrike">
                 <a:latin typeface="Arial"/>
               </a:rPr>
               <a:t>Fourth Outline Level</a:t>
             </a:r>
-            <a:endParaRPr b="0" lang="en-GB" sz="1800" spc="-1" strike="noStrike">
+            <a:endParaRPr b="0" lang="en-US" sz="1800" spc="-1" strike="noStrike">
               <a:latin typeface="Arial"/>
             </a:endParaRPr>
           </a:p>
@@ -8444,12 +8444,12 @@
               <a:buChar char=""/>
             </a:pPr>
             <a:r>
-              <a:rPr b="0" lang="en-GB" sz="1800" spc="-1" strike="noStrike">
+              <a:rPr b="0" lang="en-US" sz="1800" spc="-1" strike="noStrike">
                 <a:latin typeface="Arial"/>
               </a:rPr>
               <a:t>Fifth Outline Level</a:t>
             </a:r>
-            <a:endParaRPr b="0" lang="en-GB" sz="1800" spc="-1" strike="noStrike">
+            <a:endParaRPr b="0" lang="en-US" sz="1800" spc="-1" strike="noStrike">
               <a:latin typeface="Arial"/>
             </a:endParaRPr>
           </a:p>
@@ -8466,12 +8466,12 @@
               <a:buChar char=""/>
             </a:pPr>
             <a:r>
-              <a:rPr b="0" lang="en-GB" sz="1800" spc="-1" strike="noStrike">
+              <a:rPr b="0" lang="en-US" sz="1800" spc="-1" strike="noStrike">
                 <a:latin typeface="Arial"/>
               </a:rPr>
               <a:t>Sixth Outline Level</a:t>
             </a:r>
-            <a:endParaRPr b="0" lang="en-GB" sz="1800" spc="-1" strike="noStrike">
+            <a:endParaRPr b="0" lang="en-US" sz="1800" spc="-1" strike="noStrike">
               <a:latin typeface="Arial"/>
             </a:endParaRPr>
           </a:p>
@@ -8488,12 +8488,12 @@
               <a:buChar char=""/>
             </a:pPr>
             <a:r>
-              <a:rPr b="0" lang="en-GB" sz="1800" spc="-1" strike="noStrike">
+              <a:rPr b="0" lang="en-US" sz="1800" spc="-1" strike="noStrike">
                 <a:latin typeface="Arial"/>
               </a:rPr>
               <a:t>Seventh Outline Level</a:t>
             </a:r>
-            <a:endParaRPr b="0" lang="en-GB" sz="1800" spc="-1" strike="noStrike">
+            <a:endParaRPr b="0" lang="en-US" sz="1800" spc="-1" strike="noStrike">
               <a:latin typeface="Arial"/>
             </a:endParaRPr>
           </a:p>
@@ -8552,9 +8552,9 @@
         <p:grpSpPr>
           <a:xfrm>
             <a:off x="0" y="857160"/>
-            <a:ext cx="11520360" cy="5997960"/>
+            <a:ext cx="11520000" cy="5997600"/>
             <a:chOff x="0" y="857160"/>
-            <a:chExt cx="11520360" cy="5997960"/>
+            <a:chExt cx="11520000" cy="5997600"/>
           </a:xfrm>
         </p:grpSpPr>
         <p:sp>
@@ -8566,7 +8566,7 @@
           <p:spPr>
             <a:xfrm>
               <a:off x="0" y="857160"/>
-              <a:ext cx="10855800" cy="5997960"/>
+              <a:ext cx="10855440" cy="5997600"/>
             </a:xfrm>
             <a:prstGeom prst="rect">
               <a:avLst/>
@@ -8594,7 +8594,7 @@
           <p:spPr>
             <a:xfrm>
               <a:off x="10171080" y="858240"/>
-              <a:ext cx="1346400" cy="1266840"/>
+              <a:ext cx="1346040" cy="1266480"/>
             </a:xfrm>
             <a:prstGeom prst="ellipse">
               <a:avLst/>
@@ -8622,7 +8622,7 @@
           <p:spPr>
             <a:xfrm>
               <a:off x="6527520" y="1478880"/>
-              <a:ext cx="4992840" cy="5376240"/>
+              <a:ext cx="4992480" cy="5375880"/>
             </a:xfrm>
             <a:prstGeom prst="rect">
               <a:avLst/>
@@ -8655,7 +8655,7 @@
         <p:spPr>
           <a:xfrm>
             <a:off x="119160" y="116640"/>
-            <a:ext cx="392400" cy="393840"/>
+            <a:ext cx="392040" cy="393480"/>
           </a:xfrm>
           <a:prstGeom prst="rect">
             <a:avLst/>
@@ -8691,12 +8691,12 @@
           <a:p>
             <a:pPr algn="ctr"/>
             <a:r>
-              <a:rPr b="0" lang="en-GB" sz="4400" spc="-1" strike="noStrike">
+              <a:rPr b="0" lang="en-US" sz="4400" spc="-1" strike="noStrike">
                 <a:latin typeface="Arial"/>
               </a:rPr>
               <a:t>Click to edit the title text format</a:t>
             </a:r>
-            <a:endParaRPr b="0" lang="en-GB" sz="4400" spc="-1" strike="noStrike">
+            <a:endParaRPr b="0" lang="en-US" sz="4400" spc="-1" strike="noStrike">
               <a:latin typeface="Arial"/>
             </a:endParaRPr>
           </a:p>
@@ -8738,12 +8738,12 @@
               <a:buChar char=""/>
             </a:pPr>
             <a:r>
-              <a:rPr b="0" lang="en-GB" sz="3200" spc="-1" strike="noStrike">
+              <a:rPr b="0" lang="en-US" sz="3200" spc="-1" strike="noStrike">
                 <a:latin typeface="Arial"/>
               </a:rPr>
               <a:t>Click to edit the outline text format</a:t>
             </a:r>
-            <a:endParaRPr b="0" lang="en-GB" sz="3200" spc="-1" strike="noStrike">
+            <a:endParaRPr b="0" lang="en-US" sz="3200" spc="-1" strike="noStrike">
               <a:latin typeface="Arial"/>
             </a:endParaRPr>
           </a:p>
@@ -8760,12 +8760,12 @@
               <a:buChar char=""/>
             </a:pPr>
             <a:r>
-              <a:rPr b="0" lang="en-GB" sz="2800" spc="-1" strike="noStrike">
+              <a:rPr b="0" lang="en-US" sz="2800" spc="-1" strike="noStrike">
                 <a:latin typeface="Arial"/>
               </a:rPr>
               <a:t>Second Outline Level</a:t>
             </a:r>
-            <a:endParaRPr b="0" lang="en-GB" sz="2800" spc="-1" strike="noStrike">
+            <a:endParaRPr b="0" lang="en-US" sz="2800" spc="-1" strike="noStrike">
               <a:latin typeface="Arial"/>
             </a:endParaRPr>
           </a:p>
@@ -8782,12 +8782,12 @@
               <a:buChar char=""/>
             </a:pPr>
             <a:r>
-              <a:rPr b="0" lang="en-GB" sz="2400" spc="-1" strike="noStrike">
+              <a:rPr b="0" lang="en-US" sz="2400" spc="-1" strike="noStrike">
                 <a:latin typeface="Arial"/>
               </a:rPr>
               <a:t>Third Outline Level</a:t>
             </a:r>
-            <a:endParaRPr b="0" lang="en-GB" sz="2400" spc="-1" strike="noStrike">
+            <a:endParaRPr b="0" lang="en-US" sz="2400" spc="-1" strike="noStrike">
               <a:latin typeface="Arial"/>
             </a:endParaRPr>
           </a:p>
@@ -8804,12 +8804,12 @@
               <a:buChar char=""/>
             </a:pPr>
             <a:r>
-              <a:rPr b="0" lang="en-GB" sz="2000" spc="-1" strike="noStrike">
+              <a:rPr b="0" lang="en-US" sz="2000" spc="-1" strike="noStrike">
                 <a:latin typeface="Arial"/>
               </a:rPr>
               <a:t>Fourth Outline Level</a:t>
             </a:r>
-            <a:endParaRPr b="0" lang="en-GB" sz="2000" spc="-1" strike="noStrike">
+            <a:endParaRPr b="0" lang="en-US" sz="2000" spc="-1" strike="noStrike">
               <a:latin typeface="Arial"/>
             </a:endParaRPr>
           </a:p>
@@ -8826,12 +8826,12 @@
               <a:buChar char=""/>
             </a:pPr>
             <a:r>
-              <a:rPr b="0" lang="en-GB" sz="2000" spc="-1" strike="noStrike">
+              <a:rPr b="0" lang="en-US" sz="2000" spc="-1" strike="noStrike">
                 <a:latin typeface="Arial"/>
               </a:rPr>
               <a:t>Fifth Outline Level</a:t>
             </a:r>
-            <a:endParaRPr b="0" lang="en-GB" sz="2000" spc="-1" strike="noStrike">
+            <a:endParaRPr b="0" lang="en-US" sz="2000" spc="-1" strike="noStrike">
               <a:latin typeface="Arial"/>
             </a:endParaRPr>
           </a:p>
@@ -8848,12 +8848,12 @@
               <a:buChar char=""/>
             </a:pPr>
             <a:r>
-              <a:rPr b="0" lang="en-GB" sz="2000" spc="-1" strike="noStrike">
+              <a:rPr b="0" lang="en-US" sz="2000" spc="-1" strike="noStrike">
                 <a:latin typeface="Arial"/>
               </a:rPr>
               <a:t>Sixth Outline Level</a:t>
             </a:r>
-            <a:endParaRPr b="0" lang="en-GB" sz="2000" spc="-1" strike="noStrike">
+            <a:endParaRPr b="0" lang="en-US" sz="2000" spc="-1" strike="noStrike">
               <a:latin typeface="Arial"/>
             </a:endParaRPr>
           </a:p>
@@ -8870,12 +8870,12 @@
               <a:buChar char=""/>
             </a:pPr>
             <a:r>
-              <a:rPr b="0" lang="en-GB" sz="2000" spc="-1" strike="noStrike">
+              <a:rPr b="0" lang="en-US" sz="2000" spc="-1" strike="noStrike">
                 <a:latin typeface="Arial"/>
               </a:rPr>
               <a:t>Seventh Outline Level</a:t>
             </a:r>
-            <a:endParaRPr b="0" lang="en-GB" sz="2000" spc="-1" strike="noStrike">
+            <a:endParaRPr b="0" lang="en-US" sz="2000" spc="-1" strike="noStrike">
               <a:latin typeface="Arial"/>
             </a:endParaRPr>
           </a:p>
@@ -8934,9 +8934,9 @@
         <p:grpSpPr>
           <a:xfrm>
             <a:off x="0" y="857160"/>
-            <a:ext cx="11520360" cy="5997960"/>
+            <a:ext cx="11520000" cy="5997600"/>
             <a:chOff x="0" y="857160"/>
-            <a:chExt cx="11520360" cy="5997960"/>
+            <a:chExt cx="11520000" cy="5997600"/>
           </a:xfrm>
         </p:grpSpPr>
         <p:sp>
@@ -8948,7 +8948,7 @@
           <p:spPr>
             <a:xfrm>
               <a:off x="0" y="857160"/>
-              <a:ext cx="10855800" cy="5997960"/>
+              <a:ext cx="10855440" cy="5997600"/>
             </a:xfrm>
             <a:prstGeom prst="rect">
               <a:avLst/>
@@ -8976,7 +8976,7 @@
           <p:spPr>
             <a:xfrm>
               <a:off x="10171080" y="858240"/>
-              <a:ext cx="1346400" cy="1266840"/>
+              <a:ext cx="1346040" cy="1266480"/>
             </a:xfrm>
             <a:prstGeom prst="ellipse">
               <a:avLst/>
@@ -9004,7 +9004,7 @@
           <p:spPr>
             <a:xfrm>
               <a:off x="6527520" y="1478880"/>
-              <a:ext cx="4992840" cy="5376240"/>
+              <a:ext cx="4992480" cy="5375880"/>
             </a:xfrm>
             <a:prstGeom prst="rect">
               <a:avLst/>
@@ -9037,7 +9037,7 @@
         <p:spPr>
           <a:xfrm>
             <a:off x="119160" y="116640"/>
-            <a:ext cx="392400" cy="393840"/>
+            <a:ext cx="392040" cy="393480"/>
           </a:xfrm>
           <a:prstGeom prst="rect">
             <a:avLst/>
@@ -9072,12 +9072,12 @@
           </a:bodyPr>
           <a:p>
             <a:r>
-              <a:rPr b="0" lang="en-GB" sz="1800" spc="-1" strike="noStrike">
+              <a:rPr b="0" lang="en-US" sz="1800" spc="-1" strike="noStrike">
                 <a:latin typeface="Arial"/>
               </a:rPr>
               <a:t>Click to edit the title text format</a:t>
             </a:r>
-            <a:endParaRPr b="0" lang="en-GB" sz="1800" spc="-1" strike="noStrike">
+            <a:endParaRPr b="0" lang="en-US" sz="1800" spc="-1" strike="noStrike">
               <a:latin typeface="Arial"/>
             </a:endParaRPr>
           </a:p>
@@ -9119,12 +9119,12 @@
               <a:buChar char=""/>
             </a:pPr>
             <a:r>
-              <a:rPr b="0" lang="en-GB" sz="1800" spc="-1" strike="noStrike">
+              <a:rPr b="0" lang="en-US" sz="1800" spc="-1" strike="noStrike">
                 <a:latin typeface="Arial"/>
               </a:rPr>
               <a:t>Click to edit the outline text format</a:t>
             </a:r>
-            <a:endParaRPr b="0" lang="en-GB" sz="1800" spc="-1" strike="noStrike">
+            <a:endParaRPr b="0" lang="en-US" sz="1800" spc="-1" strike="noStrike">
               <a:latin typeface="Arial"/>
             </a:endParaRPr>
           </a:p>
@@ -9141,12 +9141,12 @@
               <a:buChar char=""/>
             </a:pPr>
             <a:r>
-              <a:rPr b="0" lang="en-GB" sz="1800" spc="-1" strike="noStrike">
+              <a:rPr b="0" lang="en-US" sz="1800" spc="-1" strike="noStrike">
                 <a:latin typeface="Arial"/>
               </a:rPr>
               <a:t>Second Outline Level</a:t>
             </a:r>
-            <a:endParaRPr b="0" lang="en-GB" sz="1800" spc="-1" strike="noStrike">
+            <a:endParaRPr b="0" lang="en-US" sz="1800" spc="-1" strike="noStrike">
               <a:latin typeface="Arial"/>
             </a:endParaRPr>
           </a:p>
@@ -9163,12 +9163,12 @@
               <a:buChar char=""/>
             </a:pPr>
             <a:r>
-              <a:rPr b="0" lang="en-GB" sz="1800" spc="-1" strike="noStrike">
+              <a:rPr b="0" lang="en-US" sz="1800" spc="-1" strike="noStrike">
                 <a:latin typeface="Arial"/>
               </a:rPr>
               <a:t>Third Outline Level</a:t>
             </a:r>
-            <a:endParaRPr b="0" lang="en-GB" sz="1800" spc="-1" strike="noStrike">
+            <a:endParaRPr b="0" lang="en-US" sz="1800" spc="-1" strike="noStrike">
               <a:latin typeface="Arial"/>
             </a:endParaRPr>
           </a:p>
@@ -9185,12 +9185,12 @@
               <a:buChar char=""/>
             </a:pPr>
             <a:r>
-              <a:rPr b="0" lang="en-GB" sz="1800" spc="-1" strike="noStrike">
+              <a:rPr b="0" lang="en-US" sz="1800" spc="-1" strike="noStrike">
                 <a:latin typeface="Arial"/>
               </a:rPr>
               <a:t>Fourth Outline Level</a:t>
             </a:r>
-            <a:endParaRPr b="0" lang="en-GB" sz="1800" spc="-1" strike="noStrike">
+            <a:endParaRPr b="0" lang="en-US" sz="1800" spc="-1" strike="noStrike">
               <a:latin typeface="Arial"/>
             </a:endParaRPr>
           </a:p>
@@ -9207,12 +9207,12 @@
               <a:buChar char=""/>
             </a:pPr>
             <a:r>
-              <a:rPr b="0" lang="en-GB" sz="1800" spc="-1" strike="noStrike">
+              <a:rPr b="0" lang="en-US" sz="1800" spc="-1" strike="noStrike">
                 <a:latin typeface="Arial"/>
               </a:rPr>
               <a:t>Fifth Outline Level</a:t>
             </a:r>
-            <a:endParaRPr b="0" lang="en-GB" sz="1800" spc="-1" strike="noStrike">
+            <a:endParaRPr b="0" lang="en-US" sz="1800" spc="-1" strike="noStrike">
               <a:latin typeface="Arial"/>
             </a:endParaRPr>
           </a:p>
@@ -9229,12 +9229,12 @@
               <a:buChar char=""/>
             </a:pPr>
             <a:r>
-              <a:rPr b="0" lang="en-GB" sz="1800" spc="-1" strike="noStrike">
+              <a:rPr b="0" lang="en-US" sz="1800" spc="-1" strike="noStrike">
                 <a:latin typeface="Arial"/>
               </a:rPr>
               <a:t>Sixth Outline Level</a:t>
             </a:r>
-            <a:endParaRPr b="0" lang="en-GB" sz="1800" spc="-1" strike="noStrike">
+            <a:endParaRPr b="0" lang="en-US" sz="1800" spc="-1" strike="noStrike">
               <a:latin typeface="Arial"/>
             </a:endParaRPr>
           </a:p>
@@ -9251,12 +9251,12 @@
               <a:buChar char=""/>
             </a:pPr>
             <a:r>
-              <a:rPr b="0" lang="en-GB" sz="1800" spc="-1" strike="noStrike">
+              <a:rPr b="0" lang="en-US" sz="1800" spc="-1" strike="noStrike">
                 <a:latin typeface="Arial"/>
               </a:rPr>
               <a:t>Seventh Outline Level</a:t>
             </a:r>
-            <a:endParaRPr b="0" lang="en-GB" sz="1800" spc="-1" strike="noStrike">
+            <a:endParaRPr b="0" lang="en-US" sz="1800" spc="-1" strike="noStrike">
               <a:latin typeface="Arial"/>
             </a:endParaRPr>
           </a:p>
@@ -9298,12 +9298,12 @@
               <a:buChar char=""/>
             </a:pPr>
             <a:r>
-              <a:rPr b="0" lang="en-GB" sz="1800" spc="-1" strike="noStrike">
+              <a:rPr b="0" lang="en-US" sz="1800" spc="-1" strike="noStrike">
                 <a:latin typeface="Arial"/>
               </a:rPr>
               <a:t>Click to edit the outline text format</a:t>
             </a:r>
-            <a:endParaRPr b="0" lang="en-GB" sz="1800" spc="-1" strike="noStrike">
+            <a:endParaRPr b="0" lang="en-US" sz="1800" spc="-1" strike="noStrike">
               <a:latin typeface="Arial"/>
             </a:endParaRPr>
           </a:p>
@@ -9320,12 +9320,12 @@
               <a:buChar char=""/>
             </a:pPr>
             <a:r>
-              <a:rPr b="0" lang="en-GB" sz="1800" spc="-1" strike="noStrike">
+              <a:rPr b="0" lang="en-US" sz="1800" spc="-1" strike="noStrike">
                 <a:latin typeface="Arial"/>
               </a:rPr>
               <a:t>Second Outline Level</a:t>
             </a:r>
-            <a:endParaRPr b="0" lang="en-GB" sz="1800" spc="-1" strike="noStrike">
+            <a:endParaRPr b="0" lang="en-US" sz="1800" spc="-1" strike="noStrike">
               <a:latin typeface="Arial"/>
             </a:endParaRPr>
           </a:p>
@@ -9342,12 +9342,12 @@
               <a:buChar char=""/>
             </a:pPr>
             <a:r>
-              <a:rPr b="0" lang="en-GB" sz="1800" spc="-1" strike="noStrike">
+              <a:rPr b="0" lang="en-US" sz="1800" spc="-1" strike="noStrike">
                 <a:latin typeface="Arial"/>
               </a:rPr>
               <a:t>Third Outline Level</a:t>
             </a:r>
-            <a:endParaRPr b="0" lang="en-GB" sz="1800" spc="-1" strike="noStrike">
+            <a:endParaRPr b="0" lang="en-US" sz="1800" spc="-1" strike="noStrike">
               <a:latin typeface="Arial"/>
             </a:endParaRPr>
           </a:p>
@@ -9364,12 +9364,12 @@
               <a:buChar char=""/>
             </a:pPr>
             <a:r>
-              <a:rPr b="0" lang="en-GB" sz="1800" spc="-1" strike="noStrike">
+              <a:rPr b="0" lang="en-US" sz="1800" spc="-1" strike="noStrike">
                 <a:latin typeface="Arial"/>
               </a:rPr>
               <a:t>Fourth Outline Level</a:t>
             </a:r>
-            <a:endParaRPr b="0" lang="en-GB" sz="1800" spc="-1" strike="noStrike">
+            <a:endParaRPr b="0" lang="en-US" sz="1800" spc="-1" strike="noStrike">
               <a:latin typeface="Arial"/>
             </a:endParaRPr>
           </a:p>
@@ -9386,12 +9386,12 @@
               <a:buChar char=""/>
             </a:pPr>
             <a:r>
-              <a:rPr b="0" lang="en-GB" sz="1800" spc="-1" strike="noStrike">
+              <a:rPr b="0" lang="en-US" sz="1800" spc="-1" strike="noStrike">
                 <a:latin typeface="Arial"/>
               </a:rPr>
               <a:t>Fifth Outline Level</a:t>
             </a:r>
-            <a:endParaRPr b="0" lang="en-GB" sz="1800" spc="-1" strike="noStrike">
+            <a:endParaRPr b="0" lang="en-US" sz="1800" spc="-1" strike="noStrike">
               <a:latin typeface="Arial"/>
             </a:endParaRPr>
           </a:p>
@@ -9408,12 +9408,12 @@
               <a:buChar char=""/>
             </a:pPr>
             <a:r>
-              <a:rPr b="0" lang="en-GB" sz="1800" spc="-1" strike="noStrike">
+              <a:rPr b="0" lang="en-US" sz="1800" spc="-1" strike="noStrike">
                 <a:latin typeface="Arial"/>
               </a:rPr>
               <a:t>Sixth Outline Level</a:t>
             </a:r>
-            <a:endParaRPr b="0" lang="en-GB" sz="1800" spc="-1" strike="noStrike">
+            <a:endParaRPr b="0" lang="en-US" sz="1800" spc="-1" strike="noStrike">
               <a:latin typeface="Arial"/>
             </a:endParaRPr>
           </a:p>
@@ -9430,12 +9430,12 @@
               <a:buChar char=""/>
             </a:pPr>
             <a:r>
-              <a:rPr b="0" lang="en-GB" sz="1800" spc="-1" strike="noStrike">
+              <a:rPr b="0" lang="en-US" sz="1800" spc="-1" strike="noStrike">
                 <a:latin typeface="Arial"/>
               </a:rPr>
               <a:t>Seventh Outline Level</a:t>
             </a:r>
-            <a:endParaRPr b="0" lang="en-GB" sz="1800" spc="-1" strike="noStrike">
+            <a:endParaRPr b="0" lang="en-US" sz="1800" spc="-1" strike="noStrike">
               <a:latin typeface="Arial"/>
             </a:endParaRPr>
           </a:p>
@@ -9494,9 +9494,9 @@
         <p:grpSpPr>
           <a:xfrm>
             <a:off x="0" y="857160"/>
-            <a:ext cx="11520360" cy="5997960"/>
+            <a:ext cx="11520000" cy="5997600"/>
             <a:chOff x="0" y="857160"/>
-            <a:chExt cx="11520360" cy="5997960"/>
+            <a:chExt cx="11520000" cy="5997600"/>
           </a:xfrm>
         </p:grpSpPr>
         <p:sp>
@@ -9508,7 +9508,7 @@
           <p:spPr>
             <a:xfrm>
               <a:off x="0" y="857160"/>
-              <a:ext cx="10855800" cy="5997960"/>
+              <a:ext cx="10855440" cy="5997600"/>
             </a:xfrm>
             <a:prstGeom prst="rect">
               <a:avLst/>
@@ -9536,7 +9536,7 @@
           <p:spPr>
             <a:xfrm>
               <a:off x="10171080" y="858240"/>
-              <a:ext cx="1346400" cy="1266840"/>
+              <a:ext cx="1346040" cy="1266480"/>
             </a:xfrm>
             <a:prstGeom prst="ellipse">
               <a:avLst/>
@@ -9564,7 +9564,7 @@
           <p:spPr>
             <a:xfrm>
               <a:off x="6527520" y="1478880"/>
-              <a:ext cx="4992840" cy="5376240"/>
+              <a:ext cx="4992480" cy="5375880"/>
             </a:xfrm>
             <a:prstGeom prst="rect">
               <a:avLst/>
@@ -9597,7 +9597,7 @@
         <p:spPr>
           <a:xfrm>
             <a:off x="119160" y="116640"/>
-            <a:ext cx="392400" cy="393840"/>
+            <a:ext cx="392040" cy="393480"/>
           </a:xfrm>
           <a:prstGeom prst="rect">
             <a:avLst/>
@@ -9633,12 +9633,12 @@
           <a:p>
             <a:pPr algn="ctr"/>
             <a:r>
-              <a:rPr b="0" lang="en-GB" sz="4400" spc="-1" strike="noStrike">
+              <a:rPr b="0" lang="en-US" sz="4400" spc="-1" strike="noStrike">
                 <a:latin typeface="Arial"/>
               </a:rPr>
               <a:t>Click to edit the title text format</a:t>
             </a:r>
-            <a:endParaRPr b="0" lang="en-GB" sz="4400" spc="-1" strike="noStrike">
+            <a:endParaRPr b="0" lang="en-US" sz="4400" spc="-1" strike="noStrike">
               <a:latin typeface="Arial"/>
             </a:endParaRPr>
           </a:p>
@@ -9680,12 +9680,12 @@
               <a:buChar char=""/>
             </a:pPr>
             <a:r>
-              <a:rPr b="0" lang="en-GB" sz="3200" spc="-1" strike="noStrike">
+              <a:rPr b="0" lang="en-US" sz="3200" spc="-1" strike="noStrike">
                 <a:latin typeface="Arial"/>
               </a:rPr>
               <a:t>Click to edit the outline text format</a:t>
             </a:r>
-            <a:endParaRPr b="0" lang="en-GB" sz="3200" spc="-1" strike="noStrike">
+            <a:endParaRPr b="0" lang="en-US" sz="3200" spc="-1" strike="noStrike">
               <a:latin typeface="Arial"/>
             </a:endParaRPr>
           </a:p>
@@ -9702,12 +9702,12 @@
               <a:buChar char=""/>
             </a:pPr>
             <a:r>
-              <a:rPr b="0" lang="en-GB" sz="2800" spc="-1" strike="noStrike">
+              <a:rPr b="0" lang="en-US" sz="2800" spc="-1" strike="noStrike">
                 <a:latin typeface="Arial"/>
               </a:rPr>
               <a:t>Second Outline Level</a:t>
             </a:r>
-            <a:endParaRPr b="0" lang="en-GB" sz="2800" spc="-1" strike="noStrike">
+            <a:endParaRPr b="0" lang="en-US" sz="2800" spc="-1" strike="noStrike">
               <a:latin typeface="Arial"/>
             </a:endParaRPr>
           </a:p>
@@ -9724,12 +9724,12 @@
               <a:buChar char=""/>
             </a:pPr>
             <a:r>
-              <a:rPr b="0" lang="en-GB" sz="2400" spc="-1" strike="noStrike">
+              <a:rPr b="0" lang="en-US" sz="2400" spc="-1" strike="noStrike">
                 <a:latin typeface="Arial"/>
               </a:rPr>
               <a:t>Third Outline Level</a:t>
             </a:r>
-            <a:endParaRPr b="0" lang="en-GB" sz="2400" spc="-1" strike="noStrike">
+            <a:endParaRPr b="0" lang="en-US" sz="2400" spc="-1" strike="noStrike">
               <a:latin typeface="Arial"/>
             </a:endParaRPr>
           </a:p>
@@ -9746,12 +9746,12 @@
               <a:buChar char=""/>
             </a:pPr>
             <a:r>
-              <a:rPr b="0" lang="en-GB" sz="2000" spc="-1" strike="noStrike">
+              <a:rPr b="0" lang="en-US" sz="2000" spc="-1" strike="noStrike">
                 <a:latin typeface="Arial"/>
               </a:rPr>
               <a:t>Fourth Outline Level</a:t>
             </a:r>
-            <a:endParaRPr b="0" lang="en-GB" sz="2000" spc="-1" strike="noStrike">
+            <a:endParaRPr b="0" lang="en-US" sz="2000" spc="-1" strike="noStrike">
               <a:latin typeface="Arial"/>
             </a:endParaRPr>
           </a:p>
@@ -9768,12 +9768,12 @@
               <a:buChar char=""/>
             </a:pPr>
             <a:r>
-              <a:rPr b="0" lang="en-GB" sz="2000" spc="-1" strike="noStrike">
+              <a:rPr b="0" lang="en-US" sz="2000" spc="-1" strike="noStrike">
                 <a:latin typeface="Arial"/>
               </a:rPr>
               <a:t>Fifth Outline Level</a:t>
             </a:r>
-            <a:endParaRPr b="0" lang="en-GB" sz="2000" spc="-1" strike="noStrike">
+            <a:endParaRPr b="0" lang="en-US" sz="2000" spc="-1" strike="noStrike">
               <a:latin typeface="Arial"/>
             </a:endParaRPr>
           </a:p>
@@ -9790,12 +9790,12 @@
               <a:buChar char=""/>
             </a:pPr>
             <a:r>
-              <a:rPr b="0" lang="en-GB" sz="2000" spc="-1" strike="noStrike">
+              <a:rPr b="0" lang="en-US" sz="2000" spc="-1" strike="noStrike">
                 <a:latin typeface="Arial"/>
               </a:rPr>
               <a:t>Sixth Outline Level</a:t>
             </a:r>
-            <a:endParaRPr b="0" lang="en-GB" sz="2000" spc="-1" strike="noStrike">
+            <a:endParaRPr b="0" lang="en-US" sz="2000" spc="-1" strike="noStrike">
               <a:latin typeface="Arial"/>
             </a:endParaRPr>
           </a:p>
@@ -9812,12 +9812,12 @@
               <a:buChar char=""/>
             </a:pPr>
             <a:r>
-              <a:rPr b="0" lang="en-GB" sz="2000" spc="-1" strike="noStrike">
+              <a:rPr b="0" lang="en-US" sz="2000" spc="-1" strike="noStrike">
                 <a:latin typeface="Arial"/>
               </a:rPr>
               <a:t>Seventh Outline Level</a:t>
             </a:r>
-            <a:endParaRPr b="0" lang="en-GB" sz="2000" spc="-1" strike="noStrike">
+            <a:endParaRPr b="0" lang="en-US" sz="2000" spc="-1" strike="noStrike">
               <a:latin typeface="Arial"/>
             </a:endParaRPr>
           </a:p>
@@ -9869,7 +9869,7 @@
         <p:spPr>
           <a:xfrm>
             <a:off x="981360" y="3867840"/>
-            <a:ext cx="9518400" cy="925920"/>
+            <a:ext cx="9518040" cy="925560"/>
           </a:xfrm>
           <a:prstGeom prst="rect">
             <a:avLst/>
@@ -9909,7 +9909,7 @@
               <a:t>SAIKS 2022 final presentation</a:t>
             </a:r>
             <a:br/>
-            <a:endParaRPr b="0" lang="en-GB" sz="5200" spc="-1" strike="noStrike">
+            <a:endParaRPr b="0" lang="en-US" sz="5200" spc="-1" strike="noStrike">
               <a:latin typeface="Arial"/>
             </a:endParaRPr>
           </a:p>
@@ -9924,7 +9924,7 @@
         <p:spPr>
           <a:xfrm>
             <a:off x="981360" y="4895640"/>
-            <a:ext cx="6208200" cy="395640"/>
+            <a:ext cx="6207840" cy="395640"/>
           </a:xfrm>
           <a:prstGeom prst="rect">
             <a:avLst/>
@@ -9963,7 +9963,7 @@
               </a:rPr>
               <a:t>Bogdan Bordeianu, Filip Kovacevic, Nino Ziegelwanger </a:t>
             </a:r>
-            <a:endParaRPr b="0" lang="en-GB" sz="1400" spc="-1" strike="noStrike">
+            <a:endParaRPr b="0" lang="en-US" sz="1400" spc="-1" strike="noStrike">
               <a:latin typeface="Arial"/>
             </a:endParaRPr>
           </a:p>
@@ -10008,7 +10008,7 @@
         <p:spPr>
           <a:xfrm>
             <a:off x="1143000" y="1285920"/>
-            <a:ext cx="9903240" cy="1140120"/>
+            <a:ext cx="9902880" cy="1139760"/>
           </a:xfrm>
           <a:prstGeom prst="rect">
             <a:avLst/>
@@ -10044,7 +10044,7 @@
               </a:rPr>
               <a:t>Ontology Alignment</a:t>
             </a:r>
-            <a:endParaRPr b="0" lang="en-GB" sz="3600" spc="-1" strike="noStrike">
+            <a:endParaRPr b="0" lang="en-US" sz="3600" spc="-1" strike="noStrike">
               <a:latin typeface="Arial"/>
             </a:endParaRPr>
           </a:p>
@@ -10059,7 +10059,7 @@
         <p:spPr>
           <a:xfrm>
             <a:off x="1143000" y="2571840"/>
-            <a:ext cx="9903240" cy="3551400"/>
+            <a:ext cx="9902880" cy="3551040"/>
           </a:xfrm>
           <a:prstGeom prst="rect">
             <a:avLst/>
@@ -10089,7 +10089,7 @@
         <p:spPr>
           <a:xfrm>
             <a:off x="360" y="2364120"/>
-            <a:ext cx="12189240" cy="3969360"/>
+            <a:ext cx="12188880" cy="3969000"/>
           </a:xfrm>
           <a:prstGeom prst="rect">
             <a:avLst/>
@@ -10138,7 +10138,7 @@
         <p:spPr>
           <a:xfrm>
             <a:off x="981360" y="3867840"/>
-            <a:ext cx="9518400" cy="925920"/>
+            <a:ext cx="9518040" cy="925560"/>
           </a:xfrm>
           <a:prstGeom prst="rect">
             <a:avLst/>
@@ -10178,7 +10178,7 @@
               <a:t>Questions?</a:t>
             </a:r>
             <a:br/>
-            <a:endParaRPr b="0" lang="en-GB" sz="5200" spc="-1" strike="noStrike">
+            <a:endParaRPr b="0" lang="en-US" sz="5200" spc="-1" strike="noStrike">
               <a:latin typeface="Arial"/>
             </a:endParaRPr>
           </a:p>
@@ -10223,7 +10223,7 @@
         <p:spPr>
           <a:xfrm>
             <a:off x="989280" y="1052640"/>
-            <a:ext cx="9903240" cy="1140120"/>
+            <a:ext cx="9902880" cy="1139760"/>
           </a:xfrm>
           <a:prstGeom prst="rect">
             <a:avLst/>
@@ -10264,7 +10264,7 @@
             </a:r>
             <a:br/>
             <a:br/>
-            <a:endParaRPr b="0" lang="en-GB" sz="3600" spc="-1" strike="noStrike">
+            <a:endParaRPr b="0" lang="en-US" sz="3600" spc="-1" strike="noStrike">
               <a:latin typeface="Arial"/>
             </a:endParaRPr>
           </a:p>
@@ -10279,7 +10279,7 @@
         <p:spPr>
           <a:xfrm>
             <a:off x="989280" y="2195640"/>
-            <a:ext cx="9903240" cy="4120200"/>
+            <a:ext cx="9902880" cy="4119840"/>
           </a:xfrm>
           <a:prstGeom prst="rect">
             <a:avLst/>
@@ -10300,7 +10300,7 @@
             <a:noAutofit/>
           </a:bodyPr>
           <a:p>
-            <a:pPr marL="457200" indent="-365400">
+            <a:pPr marL="457200" indent="-365040">
               <a:lnSpc>
                 <a:spcPct val="100000"/>
               </a:lnSpc>
@@ -10387,7 +10387,7 @@
               </a:rPr>
               <a:t> </a:t>
             </a:r>
-            <a:endParaRPr b="0" lang="en-GB" sz="2000" spc="-1" strike="noStrike">
+            <a:endParaRPr b="0" lang="en-US" sz="2000" spc="-1" strike="noStrike">
               <a:latin typeface="Arial"/>
             </a:endParaRPr>
           </a:p>
@@ -10406,7 +10406,7 @@
         <p:spPr>
           <a:xfrm>
             <a:off x="7090920" y="4620600"/>
-            <a:ext cx="1949760" cy="1949760"/>
+            <a:ext cx="1949400" cy="1949400"/>
           </a:xfrm>
           <a:prstGeom prst="rect">
             <a:avLst/>
@@ -10429,7 +10429,7 @@
         <p:spPr>
           <a:xfrm>
             <a:off x="4713840" y="4778640"/>
-            <a:ext cx="1633680" cy="1633680"/>
+            <a:ext cx="1633320" cy="1633320"/>
           </a:xfrm>
           <a:prstGeom prst="rect">
             <a:avLst/>
@@ -10452,7 +10452,7 @@
         <p:spPr>
           <a:xfrm>
             <a:off x="2584080" y="4896720"/>
-            <a:ext cx="1146240" cy="1397520"/>
+            <a:ext cx="1145880" cy="1397160"/>
           </a:xfrm>
           <a:prstGeom prst="rect">
             <a:avLst/>
@@ -10501,7 +10501,7 @@
         <p:spPr>
           <a:xfrm>
             <a:off x="1143000" y="1285920"/>
-            <a:ext cx="9903240" cy="1140120"/>
+            <a:ext cx="9902880" cy="1139760"/>
           </a:xfrm>
           <a:prstGeom prst="rect">
             <a:avLst/>
@@ -10541,7 +10541,7 @@
               <a:t>Football ontology members</a:t>
             </a:r>
             <a:br/>
-            <a:endParaRPr b="0" lang="en-GB" sz="3600" spc="-1" strike="noStrike">
+            <a:endParaRPr b="0" lang="en-US" sz="3600" spc="-1" strike="noStrike">
               <a:latin typeface="Arial"/>
             </a:endParaRPr>
           </a:p>
@@ -10560,7 +10560,7 @@
         <p:spPr>
           <a:xfrm>
             <a:off x="1584000" y="2127960"/>
-            <a:ext cx="2661120" cy="4493520"/>
+            <a:ext cx="2660760" cy="4493160"/>
           </a:xfrm>
           <a:prstGeom prst="rect">
             <a:avLst/>
@@ -10583,7 +10583,7 @@
         <p:spPr>
           <a:xfrm>
             <a:off x="5616000" y="2116800"/>
-            <a:ext cx="3237840" cy="4511520"/>
+            <a:ext cx="3237480" cy="4511160"/>
           </a:xfrm>
           <a:prstGeom prst="rect">
             <a:avLst/>
@@ -10602,7 +10602,7 @@
         <p:spPr>
           <a:xfrm>
             <a:off x="6192000" y="5328000"/>
-            <a:ext cx="1077840" cy="141840"/>
+            <a:ext cx="1077480" cy="141480"/>
           </a:xfrm>
           <a:prstGeom prst="rect">
             <a:avLst/>
@@ -10630,7 +10630,7 @@
         <p:spPr>
           <a:xfrm>
             <a:off x="5904000" y="4320000"/>
-            <a:ext cx="1221840" cy="285840"/>
+            <a:ext cx="1221480" cy="285480"/>
           </a:xfrm>
           <a:prstGeom prst="rect">
             <a:avLst/>
@@ -10658,7 +10658,7 @@
         <p:spPr>
           <a:xfrm>
             <a:off x="6120000" y="4824000"/>
-            <a:ext cx="1149840" cy="141840"/>
+            <a:ext cx="1149480" cy="141480"/>
           </a:xfrm>
           <a:prstGeom prst="rect">
             <a:avLst/>
@@ -10720,7 +10720,7 @@
         <p:spPr>
           <a:xfrm>
             <a:off x="7740000" y="1678320"/>
-            <a:ext cx="3237840" cy="4511520"/>
+            <a:ext cx="3237480" cy="4511160"/>
           </a:xfrm>
           <a:prstGeom prst="rect">
             <a:avLst/>
@@ -10739,7 +10739,7 @@
         <p:spPr>
           <a:xfrm>
             <a:off x="8424000" y="3982320"/>
-            <a:ext cx="1149840" cy="141840"/>
+            <a:ext cx="1149480" cy="141480"/>
           </a:xfrm>
           <a:prstGeom prst="rect">
             <a:avLst/>
@@ -10767,7 +10767,7 @@
         <p:spPr>
           <a:xfrm>
             <a:off x="8712000" y="4630320"/>
-            <a:ext cx="1149840" cy="141840"/>
+            <a:ext cx="1149480" cy="141480"/>
           </a:xfrm>
           <a:prstGeom prst="rect">
             <a:avLst/>
@@ -10795,7 +10795,7 @@
         <p:spPr>
           <a:xfrm>
             <a:off x="8568000" y="5413320"/>
-            <a:ext cx="1149840" cy="141840"/>
+            <a:ext cx="1149480" cy="141480"/>
           </a:xfrm>
           <a:prstGeom prst="rect">
             <a:avLst/>
@@ -10823,7 +10823,7 @@
         <p:spPr>
           <a:xfrm>
             <a:off x="8181000" y="5557320"/>
-            <a:ext cx="1149840" cy="366840"/>
+            <a:ext cx="1149480" cy="366480"/>
           </a:xfrm>
           <a:prstGeom prst="rect">
             <a:avLst/>
@@ -10851,7 +10851,7 @@
         <p:spPr>
           <a:xfrm>
             <a:off x="8424000" y="2686320"/>
-            <a:ext cx="1149840" cy="141840"/>
+            <a:ext cx="1149480" cy="141480"/>
           </a:xfrm>
           <a:prstGeom prst="rect">
             <a:avLst/>
@@ -10879,7 +10879,7 @@
         <p:spPr>
           <a:xfrm>
             <a:off x="8208000" y="3118320"/>
-            <a:ext cx="1149840" cy="141840"/>
+            <a:ext cx="1149480" cy="141480"/>
           </a:xfrm>
           <a:prstGeom prst="rect">
             <a:avLst/>
@@ -10907,7 +10907,7 @@
         <p:spPr>
           <a:xfrm>
             <a:off x="8568000" y="5278320"/>
-            <a:ext cx="1149840" cy="141840"/>
+            <a:ext cx="1149480" cy="141480"/>
           </a:xfrm>
           <a:prstGeom prst="rect">
             <a:avLst/>
@@ -10935,7 +10935,7 @@
         <p:spPr>
           <a:xfrm>
             <a:off x="8208000" y="1822320"/>
-            <a:ext cx="1149840" cy="141840"/>
+            <a:ext cx="1149480" cy="141480"/>
           </a:xfrm>
           <a:prstGeom prst="rect">
             <a:avLst/>
@@ -10963,7 +10963,7 @@
         <p:spPr>
           <a:xfrm>
             <a:off x="3519360" y="936000"/>
-            <a:ext cx="4472640" cy="600480"/>
+            <a:ext cx="4472280" cy="600120"/>
           </a:xfrm>
           <a:prstGeom prst="rect">
             <a:avLst/>
@@ -10999,7 +10999,7 @@
               </a:rPr>
               <a:t>Ontop Mappings</a:t>
             </a:r>
-            <a:endParaRPr b="0" lang="en-GB" sz="3600" spc="-1" strike="noStrike">
+            <a:endParaRPr b="0" lang="en-US" sz="3600" spc="-1" strike="noStrike">
               <a:latin typeface="Arial"/>
             </a:endParaRPr>
           </a:p>
@@ -11018,7 +11018,7 @@
         <p:spPr>
           <a:xfrm>
             <a:off x="1848240" y="1717920"/>
-            <a:ext cx="741600" cy="741600"/>
+            <a:ext cx="741240" cy="741240"/>
           </a:xfrm>
           <a:prstGeom prst="rect">
             <a:avLst/>
@@ -11041,7 +11041,7 @@
         <p:spPr>
           <a:xfrm>
             <a:off x="1848240" y="5520240"/>
-            <a:ext cx="741600" cy="741600"/>
+            <a:ext cx="741240" cy="741240"/>
           </a:xfrm>
           <a:prstGeom prst="rect">
             <a:avLst/>
@@ -11064,7 +11064,7 @@
         <p:spPr>
           <a:xfrm>
             <a:off x="1728000" y="1717920"/>
-            <a:ext cx="741600" cy="741600"/>
+            <a:ext cx="741240" cy="741240"/>
           </a:xfrm>
           <a:prstGeom prst="rect">
             <a:avLst/>
@@ -11087,7 +11087,7 @@
         <p:spPr>
           <a:xfrm>
             <a:off x="1776240" y="4152240"/>
-            <a:ext cx="741600" cy="741600"/>
+            <a:ext cx="741240" cy="741240"/>
           </a:xfrm>
           <a:prstGeom prst="rect">
             <a:avLst/>
@@ -11105,8 +11105,8 @@
         </p:nvSpPr>
         <p:spPr>
           <a:xfrm>
-            <a:off x="1728000" y="2533680"/>
-            <a:ext cx="635760" cy="344160"/>
+            <a:off x="1910880" y="2533680"/>
+            <a:ext cx="832320" cy="343800"/>
           </a:xfrm>
           <a:prstGeom prst="rect">
             <a:avLst/>
@@ -11142,7 +11142,7 @@
               </a:rPr>
               <a:t>Bets</a:t>
             </a:r>
-            <a:endParaRPr b="0" lang="en-GB" sz="1800" spc="-1" strike="noStrike">
+            <a:endParaRPr b="0" lang="en-US" sz="1800" spc="-1" strike="noStrike">
               <a:latin typeface="Arial"/>
             </a:endParaRPr>
           </a:p>
@@ -11157,7 +11157,7 @@
         <p:spPr>
           <a:xfrm>
             <a:off x="1872000" y="4909680"/>
-            <a:ext cx="1356480" cy="344160"/>
+            <a:ext cx="1419840" cy="343800"/>
           </a:xfrm>
           <a:prstGeom prst="rect">
             <a:avLst/>
@@ -11193,7 +11193,7 @@
               </a:rPr>
               <a:t>betting_ods</a:t>
             </a:r>
-            <a:endParaRPr b="0" lang="en-GB" sz="1800" spc="-1" strike="noStrike">
+            <a:endParaRPr b="0" lang="en-US" sz="1800" spc="-1" strike="noStrike">
               <a:latin typeface="Arial"/>
             </a:endParaRPr>
           </a:p>
@@ -11208,7 +11208,7 @@
         <p:spPr>
           <a:xfrm>
             <a:off x="1906200" y="6349680"/>
-            <a:ext cx="2368440" cy="344160"/>
+            <a:ext cx="2757240" cy="343800"/>
           </a:xfrm>
           <a:prstGeom prst="rect">
             <a:avLst/>
@@ -11242,9 +11242,9 @@
                 <a:latin typeface="Arial"/>
                 <a:ea typeface="DejaVu Sans"/>
               </a:rPr>
-              <a:t>df_full_premierleague</a:t>
+              <a:t>Premiere league games</a:t>
             </a:r>
-            <a:endParaRPr b="0" lang="en-GB" sz="1800" spc="-1" strike="noStrike">
+            <a:endParaRPr b="0" lang="en-US" sz="1800" spc="-1" strike="noStrike">
               <a:latin typeface="Arial"/>
             </a:endParaRPr>
           </a:p>
@@ -11263,7 +11263,7 @@
         <p:spPr>
           <a:xfrm>
             <a:off x="1776240" y="3024000"/>
-            <a:ext cx="741600" cy="741600"/>
+            <a:ext cx="741240" cy="741240"/>
           </a:xfrm>
           <a:prstGeom prst="rect">
             <a:avLst/>
@@ -11282,7 +11282,7 @@
         <p:spPr>
           <a:xfrm>
             <a:off x="1881360" y="3805920"/>
-            <a:ext cx="1067040" cy="344160"/>
+            <a:ext cx="1227600" cy="343800"/>
           </a:xfrm>
           <a:prstGeom prst="rect">
             <a:avLst/>
@@ -11318,7 +11318,7 @@
               </a:rPr>
               <a:t>transfers</a:t>
             </a:r>
-            <a:endParaRPr b="0" lang="en-GB" sz="1800" spc="-1" strike="noStrike">
+            <a:endParaRPr b="0" lang="en-US" sz="1800" spc="-1" strike="noStrike">
               <a:latin typeface="Arial"/>
             </a:endParaRPr>
           </a:p>
@@ -11337,7 +11337,7 @@
         <p:spPr>
           <a:xfrm>
             <a:off x="3942720" y="3744000"/>
-            <a:ext cx="447120" cy="447120"/>
+            <a:ext cx="446760" cy="446760"/>
           </a:xfrm>
           <a:prstGeom prst="rect">
             <a:avLst/>
@@ -11356,7 +11356,7 @@
         <p:spPr>
           <a:xfrm>
             <a:off x="3456000" y="4320000"/>
-            <a:ext cx="1937160" cy="487800"/>
+            <a:ext cx="1936800" cy="487440"/>
           </a:xfrm>
           <a:prstGeom prst="rect">
             <a:avLst/>
@@ -11403,7 +11403,7 @@
               </a:rPr>
               <a:t>postgres schema</a:t>
             </a:r>
-            <a:endParaRPr b="0" lang="en-GB" sz="1400" spc="-1" strike="noStrike">
+            <a:endParaRPr b="0" lang="en-US" sz="1400" spc="-1" strike="noStrike">
               <a:latin typeface="Arial"/>
             </a:endParaRPr>
           </a:p>
@@ -11418,7 +11418,7 @@
         <p:spPr>
           <a:xfrm>
             <a:off x="5544000" y="3744000"/>
-            <a:ext cx="1797840" cy="429840"/>
+            <a:ext cx="1797480" cy="429480"/>
           </a:xfrm>
           <a:prstGeom prst="rect">
             <a:avLst/>
@@ -11458,7 +11458,7 @@
               </a:rPr>
               <a:t>Ontop mappings</a:t>
             </a:r>
-            <a:endParaRPr b="0" lang="en-GB" sz="1800" spc="-1" strike="noStrike">
+            <a:endParaRPr b="0" lang="en-US" sz="1800" spc="-1" strike="noStrike">
               <a:latin typeface="Arial"/>
             </a:endParaRPr>
           </a:p>
@@ -11589,7 +11589,7 @@
         <p:spPr>
           <a:xfrm>
             <a:off x="4878720" y="6048000"/>
-            <a:ext cx="735120" cy="735120"/>
+            <a:ext cx="734760" cy="734760"/>
           </a:xfrm>
           <a:prstGeom prst="rect">
             <a:avLst/>
@@ -11608,7 +11608,7 @@
         <p:spPr>
           <a:xfrm>
             <a:off x="1152000" y="1584000"/>
-            <a:ext cx="4101840" cy="5181840"/>
+            <a:ext cx="4101480" cy="5181480"/>
           </a:xfrm>
           <a:prstGeom prst="rect">
             <a:avLst/>
@@ -11636,7 +11636,7 @@
         <p:spPr>
           <a:xfrm>
             <a:off x="8925120" y="6408000"/>
-            <a:ext cx="2269440" cy="345240"/>
+            <a:ext cx="2269080" cy="344880"/>
           </a:xfrm>
           <a:prstGeom prst="rect">
             <a:avLst/>
@@ -11672,7 +11672,7 @@
               </a:rPr>
               <a:t>https://github.com/GreenfishK/SAIKS</a:t>
             </a:r>
-            <a:endParaRPr b="0" lang="en-GB" sz="1000" spc="-1" strike="noStrike">
+            <a:endParaRPr b="0" lang="en-US" sz="1000" spc="-1" strike="noStrike">
               <a:latin typeface="Arial"/>
             </a:endParaRPr>
           </a:p>
@@ -11691,7 +11691,7 @@
         <p:spPr>
           <a:xfrm>
             <a:off x="8209080" y="6264000"/>
-            <a:ext cx="537480" cy="537480"/>
+            <a:ext cx="537120" cy="537120"/>
           </a:xfrm>
           <a:prstGeom prst="rect">
             <a:avLst/>
@@ -11714,7 +11714,7 @@
         <p:spPr>
           <a:xfrm>
             <a:off x="4752000" y="3744000"/>
-            <a:ext cx="475920" cy="490680"/>
+            <a:ext cx="475560" cy="490320"/>
           </a:xfrm>
           <a:prstGeom prst="rect">
             <a:avLst/>
@@ -11765,7 +11765,7 @@
         <p:spPr>
           <a:xfrm>
             <a:off x="10584000" y="3713040"/>
-            <a:ext cx="684000" cy="678960"/>
+            <a:ext cx="683640" cy="678600"/>
           </a:xfrm>
           <a:prstGeom prst="rect">
             <a:avLst/>
@@ -11861,14 +11861,14 @@
       </p:sp>
       <p:sp>
         <p:nvSpPr>
-          <p:cNvPr id="273" name="TextShape 26"/>
-          <p:cNvSpPr txBox="1"/>
+          <p:cNvPr id="273" name="CustomShape 26"/>
+          <p:cNvSpPr/>
           <p:nvPr/>
         </p:nvSpPr>
         <p:spPr>
           <a:xfrm>
             <a:off x="10008000" y="4389840"/>
-            <a:ext cx="1690920" cy="689760"/>
+            <a:ext cx="1690560" cy="689400"/>
           </a:xfrm>
           <a:prstGeom prst="rect">
             <a:avLst/>
@@ -11878,284 +11878,43 @@
             <a:noFill/>
           </a:ln>
         </p:spPr>
+        <p:style>
+          <a:lnRef idx="0"/>
+          <a:fillRef idx="0"/>
+          <a:effectRef idx="0"/>
+          <a:fontRef idx="minor"/>
+        </p:style>
         <p:txBody>
           <a:bodyPr lIns="90000" rIns="90000" tIns="45000" bIns="45000">
             <a:noAutofit/>
           </a:bodyPr>
           <a:p>
+            <a:pPr>
+              <a:lnSpc>
+                <a:spcPct val="100000"/>
+              </a:lnSpc>
+            </a:pPr>
             <a:r>
               <a:rPr b="0" lang="en-GB" sz="1400" spc="-1" strike="noStrike">
                 <a:latin typeface="Arial"/>
               </a:rPr>
-              <a:t>O</a:t>
-            </a:r>
-            <a:r>
-              <a:rPr b="0" lang="en-GB" sz="1400" spc="-1" strike="noStrike">
-                <a:latin typeface="Arial"/>
-              </a:rPr>
-              <a:t>v</a:t>
-            </a:r>
-            <a:r>
-              <a:rPr b="0" lang="en-GB" sz="1400" spc="-1" strike="noStrike">
-                <a:latin typeface="Arial"/>
-              </a:rPr>
-              <a:t>e</a:t>
-            </a:r>
-            <a:r>
-              <a:rPr b="0" lang="en-GB" sz="1400" spc="-1" strike="noStrike">
-                <a:latin typeface="Arial"/>
-              </a:rPr>
-              <a:t>r</a:t>
-            </a:r>
-            <a:r>
-              <a:rPr b="0" lang="en-GB" sz="1400" spc="-1" strike="noStrike">
-                <a:latin typeface="Arial"/>
-              </a:rPr>
-              <a:t> </a:t>
-            </a:r>
-            <a:r>
-              <a:rPr b="0" lang="en-GB" sz="1400" spc="-1" strike="noStrike">
-                <a:latin typeface="Arial"/>
-              </a:rPr>
-              <a:t>6</a:t>
-            </a:r>
-            <a:r>
-              <a:rPr b="0" lang="en-GB" sz="1400" spc="-1" strike="noStrike">
-                <a:latin typeface="Arial"/>
-              </a:rPr>
-              <a:t>0</a:t>
-            </a:r>
-            <a:r>
-              <a:rPr b="0" lang="en-GB" sz="1400" spc="-1" strike="noStrike">
-                <a:latin typeface="Arial"/>
-              </a:rPr>
-              <a:t>.</a:t>
-            </a:r>
-            <a:r>
-              <a:rPr b="0" lang="en-GB" sz="1400" spc="-1" strike="noStrike">
-                <a:latin typeface="Arial"/>
-              </a:rPr>
-              <a:t>0</a:t>
-            </a:r>
-            <a:r>
-              <a:rPr b="0" lang="en-GB" sz="1400" spc="-1" strike="noStrike">
-                <a:latin typeface="Arial"/>
-              </a:rPr>
-              <a:t>0</a:t>
-            </a:r>
-            <a:r>
-              <a:rPr b="0" lang="en-GB" sz="1400" spc="-1" strike="noStrike">
-                <a:latin typeface="Arial"/>
-              </a:rPr>
-              <a:t>0</a:t>
-            </a:r>
-            <a:r>
-              <a:rPr b="0" lang="en-GB" sz="1400" spc="-1" strike="noStrike">
-                <a:latin typeface="Arial"/>
-              </a:rPr>
-              <a:t> </a:t>
-            </a:r>
-            <a:r>
-              <a:rPr b="0" lang="en-GB" sz="1400" spc="-1" strike="noStrike">
-                <a:latin typeface="Arial"/>
-              </a:rPr>
-              <a:t>t</a:t>
-            </a:r>
-            <a:r>
-              <a:rPr b="0" lang="en-GB" sz="1400" spc="-1" strike="noStrike">
-                <a:latin typeface="Arial"/>
-              </a:rPr>
-              <a:t>r</a:t>
-            </a:r>
-            <a:r>
-              <a:rPr b="0" lang="en-GB" sz="1400" spc="-1" strike="noStrike">
-                <a:latin typeface="Arial"/>
-              </a:rPr>
-              <a:t>i</a:t>
-            </a:r>
-            <a:r>
-              <a:rPr b="0" lang="en-GB" sz="1400" spc="-1" strike="noStrike">
-                <a:latin typeface="Arial"/>
-              </a:rPr>
-              <a:t>p</a:t>
-            </a:r>
-            <a:r>
-              <a:rPr b="0" lang="en-GB" sz="1400" spc="-1" strike="noStrike">
-                <a:latin typeface="Arial"/>
-              </a:rPr>
-              <a:t>l</a:t>
-            </a:r>
-            <a:r>
-              <a:rPr b="0" lang="en-GB" sz="1400" spc="-1" strike="noStrike">
-                <a:latin typeface="Arial"/>
-              </a:rPr>
-              <a:t>e</a:t>
-            </a:r>
-            <a:r>
-              <a:rPr b="0" lang="en-GB" sz="1400" spc="-1" strike="noStrike">
-                <a:latin typeface="Arial"/>
-              </a:rPr>
-              <a:t>s</a:t>
+              <a:t>Over 60.000 triples</a:t>
             </a:r>
             <a:br/>
             <a:r>
               <a:rPr b="0" lang="en-GB" sz="1400" spc="-1" strike="noStrike">
                 <a:latin typeface="Arial"/>
               </a:rPr>
-              <a:t>i</a:t>
-            </a:r>
-            <a:r>
-              <a:rPr b="0" lang="en-GB" sz="1400" spc="-1" strike="noStrike">
-                <a:latin typeface="Arial"/>
-              </a:rPr>
-              <a:t>n</a:t>
-            </a:r>
-            <a:r>
-              <a:rPr b="0" lang="en-GB" sz="1400" spc="-1" strike="noStrike">
-                <a:latin typeface="Arial"/>
-              </a:rPr>
-              <a:t>c</a:t>
-            </a:r>
-            <a:r>
-              <a:rPr b="0" lang="en-GB" sz="1400" spc="-1" strike="noStrike">
-                <a:latin typeface="Arial"/>
-              </a:rPr>
-              <a:t>l</a:t>
-            </a:r>
-            <a:r>
-              <a:rPr b="0" lang="en-GB" sz="1400" spc="-1" strike="noStrike">
-                <a:latin typeface="Arial"/>
-              </a:rPr>
-              <a:t>u</a:t>
-            </a:r>
-            <a:r>
-              <a:rPr b="0" lang="en-GB" sz="1400" spc="-1" strike="noStrike">
-                <a:latin typeface="Arial"/>
-              </a:rPr>
-              <a:t>d</a:t>
-            </a:r>
-            <a:r>
-              <a:rPr b="0" lang="en-GB" sz="1400" spc="-1" strike="noStrike">
-                <a:latin typeface="Arial"/>
-              </a:rPr>
-              <a:t>i</a:t>
-            </a:r>
-            <a:r>
-              <a:rPr b="0" lang="en-GB" sz="1400" spc="-1" strike="noStrike">
-                <a:latin typeface="Arial"/>
-              </a:rPr>
-              <a:t>n</a:t>
-            </a:r>
-            <a:r>
-              <a:rPr b="0" lang="en-GB" sz="1400" spc="-1" strike="noStrike">
-                <a:latin typeface="Arial"/>
-              </a:rPr>
-              <a:t>g</a:t>
-            </a:r>
-            <a:r>
-              <a:rPr b="0" lang="en-GB" sz="1400" spc="-1" strike="noStrike">
-                <a:latin typeface="Arial"/>
-              </a:rPr>
-              <a:t> </a:t>
+              <a:t>including </a:t>
             </a:r>
             <a:br/>
             <a:r>
               <a:rPr b="0" lang="en-GB" sz="1400" spc="-1" strike="noStrike">
                 <a:latin typeface="Arial"/>
               </a:rPr>
-              <a:t>i</a:t>
+              <a:t>inferred triples</a:t>
             </a:r>
-            <a:r>
-              <a:rPr b="0" lang="en-GB" sz="1400" spc="-1" strike="noStrike">
-                <a:latin typeface="Arial"/>
-              </a:rPr>
-              <a:t>n</a:t>
-            </a:r>
-            <a:r>
-              <a:rPr b="0" lang="en-GB" sz="1400" spc="-1" strike="noStrike">
-                <a:latin typeface="Arial"/>
-              </a:rPr>
-              <a:t>f</a:t>
-            </a:r>
-            <a:r>
-              <a:rPr b="0" lang="en-GB" sz="1400" spc="-1" strike="noStrike">
-                <a:latin typeface="Arial"/>
-              </a:rPr>
-              <a:t>e</a:t>
-            </a:r>
-            <a:r>
-              <a:rPr b="0" lang="en-GB" sz="1400" spc="-1" strike="noStrike">
-                <a:latin typeface="Arial"/>
-              </a:rPr>
-              <a:t>r</a:t>
-            </a:r>
-            <a:r>
-              <a:rPr b="0" lang="en-GB" sz="1400" spc="-1" strike="noStrike">
-                <a:latin typeface="Arial"/>
-              </a:rPr>
-              <a:t>r</a:t>
-            </a:r>
-            <a:r>
-              <a:rPr b="0" lang="en-GB" sz="1400" spc="-1" strike="noStrike">
-                <a:latin typeface="Arial"/>
-              </a:rPr>
-              <a:t>e</a:t>
-            </a:r>
-            <a:r>
-              <a:rPr b="0" lang="en-GB" sz="1400" spc="-1" strike="noStrike">
-                <a:latin typeface="Arial"/>
-              </a:rPr>
-              <a:t>d</a:t>
-            </a:r>
-            <a:r>
-              <a:rPr b="0" lang="en-GB" sz="1400" spc="-1" strike="noStrike">
-                <a:latin typeface="Arial"/>
-              </a:rPr>
-              <a:t> </a:t>
-            </a:r>
-            <a:r>
-              <a:rPr b="0" lang="en-GB" sz="1400" spc="-1" strike="noStrike">
-                <a:latin typeface="Arial"/>
-              </a:rPr>
-              <a:t>t</a:t>
-            </a:r>
-            <a:r>
-              <a:rPr b="0" lang="en-GB" sz="1400" spc="-1" strike="noStrike">
-                <a:latin typeface="Arial"/>
-              </a:rPr>
-              <a:t>r</a:t>
-            </a:r>
-            <a:r>
-              <a:rPr b="0" lang="en-GB" sz="1400" spc="-1" strike="noStrike">
-                <a:latin typeface="Arial"/>
-              </a:rPr>
-              <a:t>i</a:t>
-            </a:r>
-            <a:r>
-              <a:rPr b="0" lang="en-GB" sz="1400" spc="-1" strike="noStrike">
-                <a:latin typeface="Arial"/>
-              </a:rPr>
-              <a:t>p</a:t>
-            </a:r>
-            <a:r>
-              <a:rPr b="0" lang="en-GB" sz="1400" spc="-1" strike="noStrike">
-                <a:latin typeface="Arial"/>
-              </a:rPr>
-              <a:t>l</a:t>
-            </a:r>
-            <a:r>
-              <a:rPr b="0" lang="en-GB" sz="1400" spc="-1" strike="noStrike">
-                <a:latin typeface="Arial"/>
-              </a:rPr>
-              <a:t>e</a:t>
-            </a:r>
-            <a:r>
-              <a:rPr b="0" lang="en-GB" sz="1400" spc="-1" strike="noStrike">
-                <a:latin typeface="Arial"/>
-              </a:rPr>
-              <a:t>s</a:t>
-            </a:r>
-            <a:endParaRPr b="0" lang="en-GB" sz="1400" spc="-1" strike="noStrike">
+            <a:endParaRPr b="0" lang="en-US" sz="1400" spc="-1" strike="noStrike">
               <a:latin typeface="Arial"/>
             </a:endParaRPr>
           </a:p>
@@ -12204,7 +11963,7 @@
         <p:spPr>
           <a:xfrm>
             <a:off x="2088000" y="959400"/>
-            <a:ext cx="8782200" cy="5896800"/>
+            <a:ext cx="8781840" cy="5896440"/>
           </a:xfrm>
           <a:prstGeom prst="rect">
             <a:avLst/>
@@ -12223,7 +11982,7 @@
         <p:spPr>
           <a:xfrm>
             <a:off x="1143000" y="1285920"/>
-            <a:ext cx="9903240" cy="1140120"/>
+            <a:ext cx="9902880" cy="1139760"/>
           </a:xfrm>
           <a:prstGeom prst="rect">
             <a:avLst/>
@@ -12263,7 +12022,7 @@
               <a:t>Football ontology in GraphDB</a:t>
             </a:r>
             <a:br/>
-            <a:endParaRPr b="0" lang="en-GB" sz="3600" spc="-1" strike="noStrike">
+            <a:endParaRPr b="0" lang="en-US" sz="3600" spc="-1" strike="noStrike">
               <a:latin typeface="Arial"/>
             </a:endParaRPr>
           </a:p>
@@ -12308,7 +12067,7 @@
         <p:spPr>
           <a:xfrm>
             <a:off x="1143000" y="1285920"/>
-            <a:ext cx="9903240" cy="1140120"/>
+            <a:ext cx="9902880" cy="1139760"/>
           </a:xfrm>
           <a:prstGeom prst="rect">
             <a:avLst/>
@@ -12344,7 +12103,7 @@
               </a:rPr>
               <a:t>SHACL(1)</a:t>
             </a:r>
-            <a:endParaRPr b="0" lang="en-GB" sz="3600" spc="-1" strike="noStrike">
+            <a:endParaRPr b="0" lang="en-US" sz="3600" spc="-1" strike="noStrike">
               <a:latin typeface="Arial"/>
             </a:endParaRPr>
           </a:p>
@@ -12359,7 +12118,7 @@
         <p:spPr>
           <a:xfrm>
             <a:off x="738720" y="2179800"/>
-            <a:ext cx="10307160" cy="3943440"/>
+            <a:ext cx="10306800" cy="3943080"/>
           </a:xfrm>
           <a:prstGeom prst="rect">
             <a:avLst/>
@@ -12380,7 +12139,7 @@
             <a:noAutofit/>
           </a:bodyPr>
           <a:p>
-            <a:pPr marL="571680" indent="-340200">
+            <a:pPr marL="571680" indent="-339840">
               <a:lnSpc>
                 <a:spcPct val="100000"/>
               </a:lnSpc>
@@ -12403,12 +12162,12 @@
               </a:rPr>
               <a:t>Tip Constraint</a:t>
             </a:r>
-            <a:endParaRPr b="0" lang="en-GB" sz="2400" spc="-1" strike="noStrike">
-              <a:latin typeface="Arial"/>
-            </a:endParaRPr>
-          </a:p>
-          <a:p>
-            <a:pPr lvl="1" marL="1028880" indent="-340200">
+            <a:endParaRPr b="0" lang="en-US" sz="2400" spc="-1" strike="noStrike">
+              <a:latin typeface="Arial"/>
+            </a:endParaRPr>
+          </a:p>
+          <a:p>
+            <a:pPr lvl="1" marL="1028880" indent="-339840">
               <a:lnSpc>
                 <a:spcPct val="100000"/>
               </a:lnSpc>
@@ -12451,12 +12210,12 @@
               </a:rPr>
               <a:t> String pattern “A|H|D”</a:t>
             </a:r>
-            <a:endParaRPr b="0" lang="en-GB" sz="2000" spc="-1" strike="noStrike">
-              <a:latin typeface="Arial"/>
-            </a:endParaRPr>
-          </a:p>
-          <a:p>
-            <a:pPr lvl="1" marL="1028880" indent="-340200">
+            <a:endParaRPr b="0" lang="en-US" sz="2000" spc="-1" strike="noStrike">
+              <a:latin typeface="Arial"/>
+            </a:endParaRPr>
+          </a:p>
+          <a:p>
+            <a:pPr lvl="1" marL="1028880" indent="-339840">
               <a:lnSpc>
                 <a:spcPct val="100000"/>
               </a:lnSpc>
@@ -12499,12 +12258,12 @@
               </a:rPr>
               <a:t> String pattern “.*”</a:t>
             </a:r>
-            <a:endParaRPr b="0" lang="en-GB" sz="2000" spc="-1" strike="noStrike">
-              <a:latin typeface="Arial"/>
-            </a:endParaRPr>
-          </a:p>
-          <a:p>
-            <a:pPr marL="571680" indent="-340200">
+            <a:endParaRPr b="0" lang="en-US" sz="2000" spc="-1" strike="noStrike">
+              <a:latin typeface="Arial"/>
+            </a:endParaRPr>
+          </a:p>
+          <a:p>
+            <a:pPr marL="571680" indent="-339840">
               <a:lnSpc>
                 <a:spcPct val="100000"/>
               </a:lnSpc>
@@ -12527,12 +12286,12 @@
               </a:rPr>
               <a:t>Quotes Constraint (for all quotes)</a:t>
             </a:r>
-            <a:endParaRPr b="0" lang="en-GB" sz="2400" spc="-1" strike="noStrike">
-              <a:latin typeface="Arial"/>
-            </a:endParaRPr>
-          </a:p>
-          <a:p>
-            <a:pPr lvl="1" marL="1028880" indent="-340200">
+            <a:endParaRPr b="0" lang="en-US" sz="2400" spc="-1" strike="noStrike">
+              <a:latin typeface="Arial"/>
+            </a:endParaRPr>
+          </a:p>
+          <a:p>
+            <a:pPr lvl="1" marL="1028880" indent="-339840">
               <a:lnSpc>
                 <a:spcPct val="100000"/>
               </a:lnSpc>
@@ -12555,12 +12314,12 @@
               </a:rPr>
               <a:t>minExclusive 1</a:t>
             </a:r>
-            <a:endParaRPr b="0" lang="en-GB" sz="2000" spc="-1" strike="noStrike">
-              <a:latin typeface="Arial"/>
-            </a:endParaRPr>
-          </a:p>
-          <a:p>
-            <a:pPr marL="571680" indent="-340200">
+            <a:endParaRPr b="0" lang="en-US" sz="2000" spc="-1" strike="noStrike">
+              <a:latin typeface="Arial"/>
+            </a:endParaRPr>
+          </a:p>
+          <a:p>
+            <a:pPr marL="571680" indent="-339840">
               <a:lnSpc>
                 <a:spcPct val="100000"/>
               </a:lnSpc>
@@ -12583,12 +12342,12 @@
               </a:rPr>
               <a:t>Password Constraint</a:t>
             </a:r>
-            <a:endParaRPr b="0" lang="en-GB" sz="2400" spc="-1" strike="noStrike">
-              <a:latin typeface="Arial"/>
-            </a:endParaRPr>
-          </a:p>
-          <a:p>
-            <a:pPr lvl="1" marL="1028880" indent="-340200">
+            <a:endParaRPr b="0" lang="en-US" sz="2400" spc="-1" strike="noStrike">
+              <a:latin typeface="Arial"/>
+            </a:endParaRPr>
+          </a:p>
+          <a:p>
+            <a:pPr lvl="1" marL="1028880" indent="-339840">
               <a:lnSpc>
                 <a:spcPct val="100000"/>
               </a:lnSpc>
@@ -12611,12 +12370,12 @@
               </a:rPr>
               <a:t>Exactly 1</a:t>
             </a:r>
-            <a:endParaRPr b="0" lang="en-GB" sz="2000" spc="-1" strike="noStrike">
-              <a:latin typeface="Arial"/>
-            </a:endParaRPr>
-          </a:p>
-          <a:p>
-            <a:pPr lvl="1" marL="1028880" indent="-340200">
+            <a:endParaRPr b="0" lang="en-US" sz="2000" spc="-1" strike="noStrike">
+              <a:latin typeface="Arial"/>
+            </a:endParaRPr>
+          </a:p>
+          <a:p>
+            <a:pPr lvl="1" marL="1028880" indent="-339840">
               <a:lnSpc>
                 <a:spcPct val="100000"/>
               </a:lnSpc>
@@ -12639,7 +12398,7 @@
               </a:rPr>
               <a:t>minLength 8</a:t>
             </a:r>
-            <a:endParaRPr b="0" lang="en-GB" sz="2000" spc="-1" strike="noStrike">
+            <a:endParaRPr b="0" lang="en-US" sz="2000" spc="-1" strike="noStrike">
               <a:latin typeface="Arial"/>
             </a:endParaRPr>
           </a:p>
@@ -12655,7 +12414,7 @@
                 <a:tab algn="l" pos="0"/>
               </a:tabLst>
             </a:pPr>
-            <a:endParaRPr b="0" lang="en-GB" sz="2000" spc="-1" strike="noStrike">
+            <a:endParaRPr b="0" lang="en-US" sz="2000" spc="-1" strike="noStrike">
               <a:latin typeface="Arial"/>
             </a:endParaRPr>
           </a:p>
@@ -12700,7 +12459,7 @@
         <p:spPr>
           <a:xfrm>
             <a:off x="1143000" y="1285920"/>
-            <a:ext cx="9903240" cy="1140120"/>
+            <a:ext cx="9902880" cy="1139760"/>
           </a:xfrm>
           <a:prstGeom prst="rect">
             <a:avLst/>
@@ -12736,7 +12495,7 @@
               </a:rPr>
               <a:t>SHACL(2)</a:t>
             </a:r>
-            <a:endParaRPr b="0" lang="en-GB" sz="3600" spc="-1" strike="noStrike">
+            <a:endParaRPr b="0" lang="en-US" sz="3600" spc="-1" strike="noStrike">
               <a:latin typeface="Arial"/>
             </a:endParaRPr>
           </a:p>
@@ -12751,7 +12510,7 @@
         <p:spPr>
           <a:xfrm>
             <a:off x="1143000" y="2571840"/>
-            <a:ext cx="9903240" cy="3551400"/>
+            <a:ext cx="9902880" cy="3551040"/>
           </a:xfrm>
           <a:prstGeom prst="rect">
             <a:avLst/>
@@ -12772,7 +12531,7 @@
             <a:noAutofit/>
           </a:bodyPr>
           <a:p>
-            <a:pPr marL="571680" indent="-340200">
+            <a:pPr marL="571680" indent="-339840">
               <a:lnSpc>
                 <a:spcPct val="100000"/>
               </a:lnSpc>
@@ -12795,12 +12554,12 @@
               </a:rPr>
               <a:t>Nation Constraint</a:t>
             </a:r>
-            <a:endParaRPr b="0" lang="en-GB" sz="2400" spc="-1" strike="noStrike">
-              <a:latin typeface="Arial"/>
-            </a:endParaRPr>
-          </a:p>
-          <a:p>
-            <a:pPr lvl="1" marL="1028880" indent="-340200">
+            <a:endParaRPr b="0" lang="en-US" sz="2400" spc="-1" strike="noStrike">
+              <a:latin typeface="Arial"/>
+            </a:endParaRPr>
+          </a:p>
+          <a:p>
+            <a:pPr lvl="1" marL="1028880" indent="-339840">
               <a:lnSpc>
                 <a:spcPct val="100000"/>
               </a:lnSpc>
@@ -12823,12 +12582,12 @@
               </a:rPr>
               <a:t>Exactly 1 Address</a:t>
             </a:r>
-            <a:endParaRPr b="0" lang="en-GB" sz="2000" spc="-1" strike="noStrike">
-              <a:latin typeface="Arial"/>
-            </a:endParaRPr>
-          </a:p>
-          <a:p>
-            <a:pPr lvl="1" marL="1028880" indent="-340200">
+            <a:endParaRPr b="0" lang="en-US" sz="2000" spc="-1" strike="noStrike">
+              <a:latin typeface="Arial"/>
+            </a:endParaRPr>
+          </a:p>
+          <a:p>
+            <a:pPr lvl="1" marL="1028880" indent="-339840">
               <a:lnSpc>
                 <a:spcPct val="100000"/>
               </a:lnSpc>
@@ -12851,12 +12610,12 @@
               </a:rPr>
               <a:t>Must be a String or an Address Class</a:t>
             </a:r>
-            <a:endParaRPr b="0" lang="en-GB" sz="2000" spc="-1" strike="noStrike">
-              <a:latin typeface="Arial"/>
-            </a:endParaRPr>
-          </a:p>
-          <a:p>
-            <a:pPr marL="571680" indent="-340200">
+            <a:endParaRPr b="0" lang="en-US" sz="2000" spc="-1" strike="noStrike">
+              <a:latin typeface="Arial"/>
+            </a:endParaRPr>
+          </a:p>
+          <a:p>
+            <a:pPr marL="571680" indent="-339840">
               <a:lnSpc>
                 <a:spcPct val="100000"/>
               </a:lnSpc>
@@ -12879,12 +12638,12 @@
               </a:rPr>
               <a:t>Association Contract Constraint</a:t>
             </a:r>
-            <a:endParaRPr b="0" lang="en-GB" sz="2400" spc="-1" strike="noStrike">
-              <a:latin typeface="Arial"/>
-            </a:endParaRPr>
-          </a:p>
-          <a:p>
-            <a:pPr lvl="1" marL="1028880" indent="-340200">
+            <a:endParaRPr b="0" lang="en-US" sz="2400" spc="-1" strike="noStrike">
+              <a:latin typeface="Arial"/>
+            </a:endParaRPr>
+          </a:p>
+          <a:p>
+            <a:pPr lvl="1" marL="1028880" indent="-339840">
               <a:lnSpc>
                 <a:spcPct val="100000"/>
               </a:lnSpc>
@@ -12907,12 +12666,12 @@
               </a:rPr>
               <a:t>Exactly 1 Role</a:t>
             </a:r>
-            <a:endParaRPr b="0" lang="en-GB" sz="2000" spc="-1" strike="noStrike">
-              <a:latin typeface="Arial"/>
-            </a:endParaRPr>
-          </a:p>
-          <a:p>
-            <a:pPr lvl="1" marL="1028880" indent="-340200">
+            <a:endParaRPr b="0" lang="en-US" sz="2000" spc="-1" strike="noStrike">
+              <a:latin typeface="Arial"/>
+            </a:endParaRPr>
+          </a:p>
+          <a:p>
+            <a:pPr lvl="1" marL="1028880" indent="-339840">
               <a:lnSpc>
                 <a:spcPct val="100000"/>
               </a:lnSpc>
@@ -12935,12 +12694,12 @@
               </a:rPr>
               <a:t>Min 1 Season</a:t>
             </a:r>
-            <a:endParaRPr b="0" lang="en-GB" sz="2000" spc="-1" strike="noStrike">
-              <a:latin typeface="Arial"/>
-            </a:endParaRPr>
-          </a:p>
-          <a:p>
-            <a:pPr lvl="1" marL="1028880" indent="-340200">
+            <a:endParaRPr b="0" lang="en-US" sz="2000" spc="-1" strike="noStrike">
+              <a:latin typeface="Arial"/>
+            </a:endParaRPr>
+          </a:p>
+          <a:p>
+            <a:pPr lvl="1" marL="1028880" indent="-339840">
               <a:lnSpc>
                 <a:spcPct val="100000"/>
               </a:lnSpc>
@@ -12963,12 +12722,12 @@
               </a:rPr>
               <a:t>Exactly 1 Association</a:t>
             </a:r>
-            <a:endParaRPr b="0" lang="en-GB" sz="2000" spc="-1" strike="noStrike">
-              <a:latin typeface="Arial"/>
-            </a:endParaRPr>
-          </a:p>
-          <a:p>
-            <a:pPr lvl="1" marL="1028880" indent="-340200">
+            <a:endParaRPr b="0" lang="en-US" sz="2000" spc="-1" strike="noStrike">
+              <a:latin typeface="Arial"/>
+            </a:endParaRPr>
+          </a:p>
+          <a:p>
+            <a:pPr lvl="1" marL="1028880" indent="-339840">
               <a:lnSpc>
                 <a:spcPct val="100000"/>
               </a:lnSpc>
@@ -12991,12 +12750,12 @@
               </a:rPr>
               <a:t>Exactly 1 FootballAssociate</a:t>
             </a:r>
-            <a:endParaRPr b="0" lang="en-GB" sz="2000" spc="-1" strike="noStrike">
-              <a:latin typeface="Arial"/>
-            </a:endParaRPr>
-          </a:p>
-          <a:p>
-            <a:pPr marL="457200" indent="-225720">
+            <a:endParaRPr b="0" lang="en-US" sz="2000" spc="-1" strike="noStrike">
+              <a:latin typeface="Arial"/>
+            </a:endParaRPr>
+          </a:p>
+          <a:p>
+            <a:pPr marL="457200" indent="-225360">
               <a:lnSpc>
                 <a:spcPct val="100000"/>
               </a:lnSpc>
@@ -13007,7 +12766,7 @@
                 <a:tab algn="l" pos="0"/>
               </a:tabLst>
             </a:pPr>
-            <a:endParaRPr b="0" lang="en-GB" sz="2000" spc="-1" strike="noStrike">
+            <a:endParaRPr b="0" lang="en-US" sz="2000" spc="-1" strike="noStrike">
               <a:latin typeface="Arial"/>
             </a:endParaRPr>
           </a:p>
@@ -13052,7 +12811,7 @@
         <p:spPr>
           <a:xfrm>
             <a:off x="1143000" y="1285920"/>
-            <a:ext cx="9903240" cy="678960"/>
+            <a:ext cx="9902880" cy="678600"/>
           </a:xfrm>
           <a:prstGeom prst="rect">
             <a:avLst/>
@@ -13088,7 +12847,7 @@
               </a:rPr>
               <a:t>Oops! (Before and after)</a:t>
             </a:r>
-            <a:endParaRPr b="0" lang="en-GB" sz="3600" spc="-1" strike="noStrike">
+            <a:endParaRPr b="0" lang="en-US" sz="3600" spc="-1" strike="noStrike">
               <a:latin typeface="Arial"/>
             </a:endParaRPr>
           </a:p>
@@ -13107,7 +12866,7 @@
         <p:spPr>
           <a:xfrm>
             <a:off x="502200" y="2112120"/>
-            <a:ext cx="5105520" cy="4533480"/>
+            <a:ext cx="5105160" cy="4533120"/>
           </a:xfrm>
           <a:prstGeom prst="rect">
             <a:avLst/>
@@ -13130,7 +12889,7 @@
         <p:spPr>
           <a:xfrm>
             <a:off x="5981400" y="1973880"/>
-            <a:ext cx="5105520" cy="4742280"/>
+            <a:ext cx="5105160" cy="4741920"/>
           </a:xfrm>
           <a:prstGeom prst="rect">
             <a:avLst/>
@@ -13179,7 +12938,7 @@
         <p:spPr>
           <a:xfrm>
             <a:off x="1143000" y="1285920"/>
-            <a:ext cx="9903240" cy="1140120"/>
+            <a:ext cx="9902880" cy="1139760"/>
           </a:xfrm>
           <a:prstGeom prst="rect">
             <a:avLst/>
@@ -13215,7 +12974,7 @@
               </a:rPr>
               <a:t>Ontology Alignment – Our experience</a:t>
             </a:r>
-            <a:endParaRPr b="0" lang="en-GB" sz="3600" spc="-1" strike="noStrike">
+            <a:endParaRPr b="0" lang="en-US" sz="3600" spc="-1" strike="noStrike">
               <a:latin typeface="Arial"/>
             </a:endParaRPr>
           </a:p>
@@ -13230,7 +12989,7 @@
         <p:spPr>
           <a:xfrm>
             <a:off x="1143000" y="2571840"/>
-            <a:ext cx="9903240" cy="3551400"/>
+            <a:ext cx="9902880" cy="3551040"/>
           </a:xfrm>
           <a:prstGeom prst="rect">
             <a:avLst/>
@@ -13251,7 +13010,7 @@
             <a:noAutofit/>
           </a:bodyPr>
           <a:p>
-            <a:pPr marL="457200" indent="-225720">
+            <a:pPr marL="457200" indent="-225360">
               <a:lnSpc>
                 <a:spcPct val="100000"/>
               </a:lnSpc>
@@ -13272,12 +13031,12 @@
               </a:rPr>
               <a:t>* Two different ontologies found.</a:t>
             </a:r>
-            <a:endParaRPr b="0" lang="en-GB" sz="2400" spc="-1" strike="noStrike">
-              <a:latin typeface="Arial"/>
-            </a:endParaRPr>
-          </a:p>
-          <a:p>
-            <a:pPr marL="457200" indent="-225720">
+            <a:endParaRPr b="0" lang="en-US" sz="2400" spc="-1" strike="noStrike">
+              <a:latin typeface="Arial"/>
+            </a:endParaRPr>
+          </a:p>
+          <a:p>
+            <a:pPr marL="457200" indent="-225360">
               <a:lnSpc>
                 <a:spcPct val="100000"/>
               </a:lnSpc>
@@ -13308,12 +13067,12 @@
               </a:rPr>
               <a:t>- Different complexities</a:t>
             </a:r>
-            <a:endParaRPr b="0" lang="en-GB" sz="1600" spc="-1" strike="noStrike">
-              <a:latin typeface="Arial"/>
-            </a:endParaRPr>
-          </a:p>
-          <a:p>
-            <a:pPr marL="457200" indent="-225720">
+            <a:endParaRPr b="0" lang="en-US" sz="1600" spc="-1" strike="noStrike">
+              <a:latin typeface="Arial"/>
+            </a:endParaRPr>
+          </a:p>
+          <a:p>
+            <a:pPr marL="457200" indent="-225360">
               <a:lnSpc>
                 <a:spcPct val="100000"/>
               </a:lnSpc>
@@ -13344,12 +13103,12 @@
               </a:rPr>
               <a:t>- No betting concepts in the second ontology</a:t>
             </a:r>
-            <a:endParaRPr b="0" lang="en-GB" sz="1600" spc="-1" strike="noStrike">
-              <a:latin typeface="Arial"/>
-            </a:endParaRPr>
-          </a:p>
-          <a:p>
-            <a:pPr marL="457200" indent="-225720">
+            <a:endParaRPr b="0" lang="en-US" sz="1600" spc="-1" strike="noStrike">
+              <a:latin typeface="Arial"/>
+            </a:endParaRPr>
+          </a:p>
+          <a:p>
+            <a:pPr marL="457200" indent="-225360">
               <a:lnSpc>
                 <a:spcPct val="100000"/>
               </a:lnSpc>
@@ -13370,12 +13129,12 @@
               </a:rPr>
               <a:t>* Used Logmap and AgreementMaker</a:t>
             </a:r>
-            <a:endParaRPr b="0" lang="en-GB" sz="2400" spc="-1" strike="noStrike">
-              <a:latin typeface="Arial"/>
-            </a:endParaRPr>
-          </a:p>
-          <a:p>
-            <a:pPr marL="457200" indent="-225720">
+            <a:endParaRPr b="0" lang="en-US" sz="2400" spc="-1" strike="noStrike">
+              <a:latin typeface="Arial"/>
+            </a:endParaRPr>
+          </a:p>
+          <a:p>
+            <a:pPr marL="457200" indent="-225360">
               <a:lnSpc>
                 <a:spcPct val="100000"/>
               </a:lnSpc>
@@ -13406,12 +13165,12 @@
               </a:rPr>
               <a:t>- Only Logmap was able to deliver a result for only one of the two ontologies</a:t>
             </a:r>
-            <a:endParaRPr b="0" lang="en-GB" sz="1600" spc="-1" strike="noStrike">
-              <a:latin typeface="Arial"/>
-            </a:endParaRPr>
-          </a:p>
-          <a:p>
-            <a:pPr marL="457200" indent="-225720">
+            <a:endParaRPr b="0" lang="en-US" sz="1600" spc="-1" strike="noStrike">
+              <a:latin typeface="Arial"/>
+            </a:endParaRPr>
+          </a:p>
+          <a:p>
+            <a:pPr marL="457200" indent="-225360">
               <a:lnSpc>
                 <a:spcPct val="100000"/>
               </a:lnSpc>
@@ -13442,12 +13201,12 @@
               </a:rPr>
               <a:t>- One similar class found</a:t>
             </a:r>
-            <a:endParaRPr b="0" lang="en-GB" sz="1600" spc="-1" strike="noStrike">
-              <a:latin typeface="Arial"/>
-            </a:endParaRPr>
-          </a:p>
-          <a:p>
-            <a:pPr marL="457200" indent="-225720">
+            <a:endParaRPr b="0" lang="en-US" sz="1600" spc="-1" strike="noStrike">
+              <a:latin typeface="Arial"/>
+            </a:endParaRPr>
+          </a:p>
+          <a:p>
+            <a:pPr marL="457200" indent="-225360">
               <a:lnSpc>
                 <a:spcPct val="100000"/>
               </a:lnSpc>
@@ -13468,12 +13227,12 @@
               </a:rPr>
               <a:t>* Matched classes do not have the same semantics</a:t>
             </a:r>
-            <a:endParaRPr b="0" lang="en-GB" sz="2400" spc="-1" strike="noStrike">
-              <a:latin typeface="Arial"/>
-            </a:endParaRPr>
-          </a:p>
-          <a:p>
-            <a:pPr marL="457200" indent="-225720">
+            <a:endParaRPr b="0" lang="en-US" sz="2400" spc="-1" strike="noStrike">
+              <a:latin typeface="Arial"/>
+            </a:endParaRPr>
+          </a:p>
+          <a:p>
+            <a:pPr marL="457200" indent="-225360">
               <a:lnSpc>
                 <a:spcPct val="100000"/>
               </a:lnSpc>
@@ -13504,12 +13263,12 @@
               </a:rPr>
               <a:t>- Our Person class also includes legal bodies while the other does not</a:t>
             </a:r>
-            <a:endParaRPr b="0" lang="en-GB" sz="1600" spc="-1" strike="noStrike">
-              <a:latin typeface="Arial"/>
-            </a:endParaRPr>
-          </a:p>
-          <a:p>
-            <a:pPr marL="457200" indent="-225720">
+            <a:endParaRPr b="0" lang="en-US" sz="1600" spc="-1" strike="noStrike">
+              <a:latin typeface="Arial"/>
+            </a:endParaRPr>
+          </a:p>
+          <a:p>
+            <a:pPr marL="457200" indent="-225360">
               <a:lnSpc>
                 <a:spcPct val="100000"/>
               </a:lnSpc>
@@ -13520,12 +13279,12 @@
                 <a:tab algn="l" pos="0"/>
               </a:tabLst>
             </a:pPr>
-            <a:endParaRPr b="0" lang="en-GB" sz="1600" spc="-1" strike="noStrike">
-              <a:latin typeface="Arial"/>
-            </a:endParaRPr>
-          </a:p>
-          <a:p>
-            <a:pPr marL="457200" indent="-225720">
+            <a:endParaRPr b="0" lang="en-US" sz="1600" spc="-1" strike="noStrike">
+              <a:latin typeface="Arial"/>
+            </a:endParaRPr>
+          </a:p>
+          <a:p>
+            <a:pPr marL="457200" indent="-225360">
               <a:lnSpc>
                 <a:spcPct val="100000"/>
               </a:lnSpc>
@@ -13546,7 +13305,7 @@
               </a:rPr>
               <a:t> </a:t>
             </a:r>
-            <a:endParaRPr b="0" lang="en-GB" sz="1400" spc="-1" strike="noStrike">
+            <a:endParaRPr b="0" lang="en-US" sz="1400" spc="-1" strike="noStrike">
               <a:latin typeface="Arial"/>
             </a:endParaRPr>
           </a:p>

</xml_diff>